<commit_message>
finish skeleton of slide deck
</commit_message>
<xml_diff>
--- a/Python Performance Talk.pptx
+++ b/Python Performance Talk.pptx
@@ -12,6 +12,13 @@
     <p:sldId id="260" r:id="rId6"/>
     <p:sldId id="261" r:id="rId7"/>
     <p:sldId id="262" r:id="rId8"/>
+    <p:sldId id="263" r:id="rId9"/>
+    <p:sldId id="264" r:id="rId10"/>
+    <p:sldId id="266" r:id="rId11"/>
+    <p:sldId id="265" r:id="rId12"/>
+    <p:sldId id="269" r:id="rId13"/>
+    <p:sldId id="268" r:id="rId14"/>
+    <p:sldId id="267" r:id="rId15"/>
   </p:sldIdLst>
   <p:sldSz cx="9144000" cy="6858000" type="screen4x3"/>
   <p:notesSz cx="6858000" cy="9144000"/>
@@ -396,7 +403,7 @@
           <a:p>
             <a:fld id="{B01F9CA3-105E-4857-9057-6DB6197DA786}" type="datetimeFigureOut">
               <a:rPr lang="en-US" smtClean="0"/>
-              <a:t>4/21/17</a:t>
+              <a:t>4/23/17</a:t>
             </a:fld>
             <a:endParaRPr lang="en-US"/>
           </a:p>
@@ -588,7 +595,7 @@
           <a:p>
             <a:fld id="{B01F9CA3-105E-4857-9057-6DB6197DA786}" type="datetimeFigureOut">
               <a:rPr lang="en-US" smtClean="0"/>
-              <a:t>4/21/17</a:t>
+              <a:t>4/23/17</a:t>
             </a:fld>
             <a:endParaRPr lang="en-US"/>
           </a:p>
@@ -857,7 +864,7 @@
           <a:p>
             <a:fld id="{B01F9CA3-105E-4857-9057-6DB6197DA786}" type="datetimeFigureOut">
               <a:rPr lang="en-US" smtClean="0"/>
-              <a:t>4/21/17</a:t>
+              <a:t>4/23/17</a:t>
             </a:fld>
             <a:endParaRPr lang="en-US"/>
           </a:p>
@@ -1036,7 +1043,7 @@
           <a:p>
             <a:fld id="{B01F9CA3-105E-4857-9057-6DB6197DA786}" type="datetimeFigureOut">
               <a:rPr lang="en-US" smtClean="0"/>
-              <a:t>4/21/17</a:t>
+              <a:t>4/23/17</a:t>
             </a:fld>
             <a:endParaRPr lang="en-US"/>
           </a:p>
@@ -1205,7 +1212,7 @@
           <a:p>
             <a:fld id="{B01F9CA3-105E-4857-9057-6DB6197DA786}" type="datetimeFigureOut">
               <a:rPr lang="en-US" smtClean="0"/>
-              <a:t>4/21/17</a:t>
+              <a:t>4/23/17</a:t>
             </a:fld>
             <a:endParaRPr lang="en-US"/>
           </a:p>
@@ -1447,7 +1454,7 @@
           <a:p>
             <a:fld id="{B01F9CA3-105E-4857-9057-6DB6197DA786}" type="datetimeFigureOut">
               <a:rPr lang="en-US" smtClean="0"/>
-              <a:t>4/21/17</a:t>
+              <a:t>4/23/17</a:t>
             </a:fld>
             <a:endParaRPr lang="en-US"/>
           </a:p>
@@ -1770,7 +1777,7 @@
           <a:p>
             <a:fld id="{B01F9CA3-105E-4857-9057-6DB6197DA786}" type="datetimeFigureOut">
               <a:rPr lang="en-US" smtClean="0"/>
-              <a:t>4/21/17</a:t>
+              <a:t>4/23/17</a:t>
             </a:fld>
             <a:endParaRPr lang="en-US"/>
           </a:p>
@@ -2068,7 +2075,7 @@
           <a:p>
             <a:fld id="{B01F9CA3-105E-4857-9057-6DB6197DA786}" type="datetimeFigureOut">
               <a:rPr lang="en-US" smtClean="0"/>
-              <a:t>4/21/17</a:t>
+              <a:t>4/23/17</a:t>
             </a:fld>
             <a:endParaRPr lang="en-US"/>
           </a:p>
@@ -2524,7 +2531,7 @@
           <a:p>
             <a:fld id="{B01F9CA3-105E-4857-9057-6DB6197DA786}" type="datetimeFigureOut">
               <a:rPr lang="en-US" smtClean="0"/>
-              <a:t>4/21/17</a:t>
+              <a:t>4/23/17</a:t>
             </a:fld>
             <a:endParaRPr lang="en-US"/>
           </a:p>
@@ -2637,7 +2644,7 @@
           <a:p>
             <a:fld id="{B01F9CA3-105E-4857-9057-6DB6197DA786}" type="datetimeFigureOut">
               <a:rPr lang="en-US" smtClean="0"/>
-              <a:t>4/21/17</a:t>
+              <a:t>4/23/17</a:t>
             </a:fld>
             <a:endParaRPr lang="en-US"/>
           </a:p>
@@ -2727,7 +2734,7 @@
           <a:p>
             <a:fld id="{B01F9CA3-105E-4857-9057-6DB6197DA786}" type="datetimeFigureOut">
               <a:rPr lang="en-US" smtClean="0"/>
-              <a:t>4/21/17</a:t>
+              <a:t>4/23/17</a:t>
             </a:fld>
             <a:endParaRPr lang="en-US"/>
           </a:p>
@@ -3009,7 +3016,7 @@
           <a:p>
             <a:fld id="{B01F9CA3-105E-4857-9057-6DB6197DA786}" type="datetimeFigureOut">
               <a:rPr lang="en-US" smtClean="0"/>
-              <a:t>4/21/17</a:t>
+              <a:t>4/23/17</a:t>
             </a:fld>
             <a:endParaRPr lang="en-US"/>
           </a:p>
@@ -3215,7 +3222,7 @@
           <a:p>
             <a:fld id="{B01F9CA3-105E-4857-9057-6DB6197DA786}" type="datetimeFigureOut">
               <a:rPr lang="en-US" smtClean="0"/>
-              <a:t>4/21/17</a:t>
+              <a:t>4/23/17</a:t>
             </a:fld>
             <a:endParaRPr lang="en-US"/>
           </a:p>
@@ -3755,6 +3762,535 @@
   <p:clrMapOvr>
     <a:masterClrMapping/>
   </p:clrMapOvr>
+  <p:timing>
+    <p:tnLst>
+      <p:par>
+        <p:cTn xmlns:p14="http://schemas.microsoft.com/office/powerpoint/2010/main" id="1" dur="indefinite" restart="never" nodeType="tmRoot"/>
+      </p:par>
+    </p:tnLst>
+  </p:timing>
+</p:sld>
+</file>
+
+<file path=ppt/slides/slide10.xml><?xml version="1.0" encoding="utf-8"?>
+<p:sld xmlns:a="http://schemas.openxmlformats.org/drawingml/2006/main" xmlns:r="http://schemas.openxmlformats.org/officeDocument/2006/relationships" xmlns:p="http://schemas.openxmlformats.org/presentationml/2006/main">
+  <p:cSld>
+    <p:spTree>
+      <p:nvGrpSpPr>
+        <p:cNvPr id="1" name=""/>
+        <p:cNvGrpSpPr/>
+        <p:nvPr/>
+      </p:nvGrpSpPr>
+      <p:grpSpPr>
+        <a:xfrm>
+          <a:off x="0" y="0"/>
+          <a:ext cx="0" cy="0"/>
+          <a:chOff x="0" y="0"/>
+          <a:chExt cx="0" cy="0"/>
+        </a:xfrm>
+      </p:grpSpPr>
+      <p:sp>
+        <p:nvSpPr>
+          <p:cNvPr id="2" name="Title 1"/>
+          <p:cNvSpPr>
+            <a:spLocks noGrp="1"/>
+          </p:cNvSpPr>
+          <p:nvPr>
+            <p:ph type="title"/>
+          </p:nvPr>
+        </p:nvSpPr>
+        <p:spPr/>
+        <p:txBody>
+          <a:bodyPr/>
+          <a:lstStyle/>
+          <a:p>
+            <a:r>
+              <a:rPr lang="en-US" dirty="0" smtClean="0"/>
+              <a:t>Rosalind Sample</a:t>
+            </a:r>
+            <a:endParaRPr lang="en-US" dirty="0"/>
+          </a:p>
+        </p:txBody>
+      </p:sp>
+      <p:sp>
+        <p:nvSpPr>
+          <p:cNvPr id="3" name="Content Placeholder 2"/>
+          <p:cNvSpPr>
+            <a:spLocks noGrp="1"/>
+          </p:cNvSpPr>
+          <p:nvPr>
+            <p:ph idx="1"/>
+          </p:nvPr>
+        </p:nvSpPr>
+        <p:spPr/>
+        <p:txBody>
+          <a:bodyPr/>
+          <a:lstStyle/>
+          <a:p>
+            <a:r>
+              <a:rPr lang="en-US" dirty="0" smtClean="0"/>
+              <a:t>BINS combines all of the above…</a:t>
+            </a:r>
+          </a:p>
+          <a:p>
+            <a:pPr lvl="1"/>
+            <a:r>
+              <a:rPr lang="en-US" dirty="0" smtClean="0"/>
+              <a:t>Brute force – “make it work…”</a:t>
+            </a:r>
+          </a:p>
+          <a:p>
+            <a:pPr lvl="1"/>
+            <a:r>
+              <a:rPr lang="en-US" dirty="0"/>
+              <a:t>b</a:t>
+            </a:r>
+            <a:r>
+              <a:rPr lang="en-US" dirty="0" smtClean="0"/>
+              <a:t>isection module – “…then make it fast”</a:t>
+            </a:r>
+          </a:p>
+          <a:p>
+            <a:pPr lvl="1"/>
+            <a:r>
+              <a:rPr lang="en-US" dirty="0" smtClean="0"/>
+              <a:t>Hash lookup – using more memory allows faster algorithm – memory/speed tradeoff</a:t>
+            </a:r>
+          </a:p>
+        </p:txBody>
+      </p:sp>
+    </p:spTree>
+    <p:extLst>
+      <p:ext uri="{BB962C8B-B14F-4D97-AF65-F5344CB8AC3E}">
+        <p14:creationId xmlns:p14="http://schemas.microsoft.com/office/powerpoint/2010/main" val="2050719833"/>
+      </p:ext>
+    </p:extLst>
+  </p:cSld>
+  <p:clrMapOvr>
+    <a:masterClrMapping/>
+  </p:clrMapOvr>
+  <p:timing>
+    <p:tnLst>
+      <p:par>
+        <p:cTn xmlns:p14="http://schemas.microsoft.com/office/powerpoint/2010/main" id="1" dur="indefinite" restart="never" nodeType="tmRoot"/>
+      </p:par>
+    </p:tnLst>
+  </p:timing>
+</p:sld>
+</file>
+
+<file path=ppt/slides/slide11.xml><?xml version="1.0" encoding="utf-8"?>
+<p:sld xmlns:a="http://schemas.openxmlformats.org/drawingml/2006/main" xmlns:r="http://schemas.openxmlformats.org/officeDocument/2006/relationships" xmlns:p="http://schemas.openxmlformats.org/presentationml/2006/main">
+  <p:cSld>
+    <p:spTree>
+      <p:nvGrpSpPr>
+        <p:cNvPr id="1" name=""/>
+        <p:cNvGrpSpPr/>
+        <p:nvPr/>
+      </p:nvGrpSpPr>
+      <p:grpSpPr>
+        <a:xfrm>
+          <a:off x="0" y="0"/>
+          <a:ext cx="0" cy="0"/>
+          <a:chOff x="0" y="0"/>
+          <a:chExt cx="0" cy="0"/>
+        </a:xfrm>
+      </p:grpSpPr>
+      <p:sp>
+        <p:nvSpPr>
+          <p:cNvPr id="2" name="Title 1"/>
+          <p:cNvSpPr>
+            <a:spLocks noGrp="1"/>
+          </p:cNvSpPr>
+          <p:nvPr>
+            <p:ph type="title"/>
+          </p:nvPr>
+        </p:nvSpPr>
+        <p:spPr/>
+        <p:txBody>
+          <a:bodyPr/>
+          <a:lstStyle/>
+          <a:p>
+            <a:r>
+              <a:rPr lang="en-US" dirty="0" smtClean="0"/>
+              <a:t>Surprises</a:t>
+            </a:r>
+            <a:endParaRPr lang="en-US" dirty="0"/>
+          </a:p>
+        </p:txBody>
+      </p:sp>
+      <p:sp>
+        <p:nvSpPr>
+          <p:cNvPr id="3" name="Content Placeholder 2"/>
+          <p:cNvSpPr>
+            <a:spLocks noGrp="1"/>
+          </p:cNvSpPr>
+          <p:nvPr>
+            <p:ph idx="1"/>
+          </p:nvPr>
+        </p:nvSpPr>
+        <p:spPr/>
+        <p:txBody>
+          <a:bodyPr/>
+          <a:lstStyle/>
+          <a:p>
+            <a:r>
+              <a:rPr lang="en-US" dirty="0" smtClean="0"/>
+              <a:t>Modules aren’t always faster</a:t>
+            </a:r>
+          </a:p>
+          <a:p>
+            <a:r>
+              <a:rPr lang="en-US" dirty="0" err="1" smtClean="0"/>
+              <a:t>Jython</a:t>
+            </a:r>
+            <a:r>
+              <a:rPr lang="en-US" dirty="0" smtClean="0"/>
+              <a:t> and </a:t>
+            </a:r>
+            <a:r>
+              <a:rPr lang="en-US" dirty="0" err="1" smtClean="0"/>
+              <a:t>PyPy</a:t>
+            </a:r>
+            <a:r>
+              <a:rPr lang="en-US" dirty="0" smtClean="0"/>
+              <a:t> aren’t always faster</a:t>
+            </a:r>
+            <a:endParaRPr lang="en-US" dirty="0"/>
+          </a:p>
+        </p:txBody>
+      </p:sp>
+    </p:spTree>
+    <p:extLst>
+      <p:ext uri="{BB962C8B-B14F-4D97-AF65-F5344CB8AC3E}">
+        <p14:creationId xmlns:p14="http://schemas.microsoft.com/office/powerpoint/2010/main" val="195785376"/>
+      </p:ext>
+    </p:extLst>
+  </p:cSld>
+  <p:clrMapOvr>
+    <a:masterClrMapping/>
+  </p:clrMapOvr>
+  <p:timing>
+    <p:tnLst>
+      <p:par>
+        <p:cTn xmlns:p14="http://schemas.microsoft.com/office/powerpoint/2010/main" id="1" dur="indefinite" restart="never" nodeType="tmRoot"/>
+      </p:par>
+    </p:tnLst>
+  </p:timing>
+</p:sld>
+</file>
+
+<file path=ppt/slides/slide12.xml><?xml version="1.0" encoding="utf-8"?>
+<p:sld xmlns:a="http://schemas.openxmlformats.org/drawingml/2006/main" xmlns:r="http://schemas.openxmlformats.org/officeDocument/2006/relationships" xmlns:p="http://schemas.openxmlformats.org/presentationml/2006/main">
+  <p:cSld>
+    <p:spTree>
+      <p:nvGrpSpPr>
+        <p:cNvPr id="1" name=""/>
+        <p:cNvGrpSpPr/>
+        <p:nvPr/>
+      </p:nvGrpSpPr>
+      <p:grpSpPr>
+        <a:xfrm>
+          <a:off x="0" y="0"/>
+          <a:ext cx="0" cy="0"/>
+          <a:chOff x="0" y="0"/>
+          <a:chExt cx="0" cy="0"/>
+        </a:xfrm>
+      </p:grpSpPr>
+      <p:sp>
+        <p:nvSpPr>
+          <p:cNvPr id="2" name="Title 1"/>
+          <p:cNvSpPr>
+            <a:spLocks noGrp="1"/>
+          </p:cNvSpPr>
+          <p:nvPr>
+            <p:ph type="title"/>
+          </p:nvPr>
+        </p:nvSpPr>
+        <p:spPr/>
+        <p:txBody>
+          <a:bodyPr/>
+          <a:lstStyle/>
+          <a:p>
+            <a:r>
+              <a:rPr lang="en-US" dirty="0" smtClean="0"/>
+              <a:t>Sailing Over the Edge</a:t>
+            </a:r>
+            <a:endParaRPr lang="en-US" dirty="0"/>
+          </a:p>
+        </p:txBody>
+      </p:sp>
+      <p:sp>
+        <p:nvSpPr>
+          <p:cNvPr id="3" name="Content Placeholder 2"/>
+          <p:cNvSpPr>
+            <a:spLocks noGrp="1"/>
+          </p:cNvSpPr>
+          <p:nvPr>
+            <p:ph idx="1"/>
+          </p:nvPr>
+        </p:nvSpPr>
+        <p:spPr/>
+        <p:txBody>
+          <a:bodyPr/>
+          <a:lstStyle/>
+          <a:p>
+            <a:r>
+              <a:rPr lang="en-US" dirty="0" err="1" smtClean="0"/>
+              <a:t>Cython</a:t>
+            </a:r>
+            <a:endParaRPr lang="en-US" dirty="0" smtClean="0"/>
+          </a:p>
+          <a:p>
+            <a:r>
+              <a:rPr lang="en-US" dirty="0" smtClean="0"/>
+              <a:t>Multiprocessing</a:t>
+            </a:r>
+          </a:p>
+          <a:p>
+            <a:pPr lvl="1"/>
+            <a:r>
+              <a:rPr lang="en-US" dirty="0" smtClean="0"/>
+              <a:t>The GIL</a:t>
+            </a:r>
+          </a:p>
+          <a:p>
+            <a:pPr lvl="1"/>
+            <a:r>
+              <a:rPr lang="en-US" dirty="0" err="1" smtClean="0"/>
+              <a:t>Jython</a:t>
+            </a:r>
+            <a:r>
+              <a:rPr lang="en-US" dirty="0" smtClean="0"/>
+              <a:t> – no GIL – true multithreading</a:t>
+            </a:r>
+            <a:endParaRPr lang="en-US" dirty="0"/>
+          </a:p>
+        </p:txBody>
+      </p:sp>
+    </p:spTree>
+    <p:extLst>
+      <p:ext uri="{BB962C8B-B14F-4D97-AF65-F5344CB8AC3E}">
+        <p14:creationId xmlns:p14="http://schemas.microsoft.com/office/powerpoint/2010/main" val="3906047054"/>
+      </p:ext>
+    </p:extLst>
+  </p:cSld>
+  <p:clrMapOvr>
+    <a:masterClrMapping/>
+  </p:clrMapOvr>
+</p:sld>
+</file>
+
+<file path=ppt/slides/slide13.xml><?xml version="1.0" encoding="utf-8"?>
+<p:sld xmlns:a="http://schemas.openxmlformats.org/drawingml/2006/main" xmlns:r="http://schemas.openxmlformats.org/officeDocument/2006/relationships" xmlns:p="http://schemas.openxmlformats.org/presentationml/2006/main">
+  <p:cSld>
+    <p:spTree>
+      <p:nvGrpSpPr>
+        <p:cNvPr id="1" name=""/>
+        <p:cNvGrpSpPr/>
+        <p:nvPr/>
+      </p:nvGrpSpPr>
+      <p:grpSpPr>
+        <a:xfrm>
+          <a:off x="0" y="0"/>
+          <a:ext cx="0" cy="0"/>
+          <a:chOff x="0" y="0"/>
+          <a:chExt cx="0" cy="0"/>
+        </a:xfrm>
+      </p:grpSpPr>
+      <p:sp>
+        <p:nvSpPr>
+          <p:cNvPr id="2" name="Title 1"/>
+          <p:cNvSpPr>
+            <a:spLocks noGrp="1"/>
+          </p:cNvSpPr>
+          <p:nvPr>
+            <p:ph type="title"/>
+          </p:nvPr>
+        </p:nvSpPr>
+        <p:spPr/>
+        <p:txBody>
+          <a:bodyPr/>
+          <a:lstStyle/>
+          <a:p>
+            <a:r>
+              <a:rPr lang="en-US" dirty="0" smtClean="0">
+                <a:latin typeface="Apple Chancery"/>
+              </a:rPr>
+              <a:t>Thank You!</a:t>
+            </a:r>
+            <a:endParaRPr lang="en-US" dirty="0">
+              <a:latin typeface="Apple Chancery"/>
+            </a:endParaRPr>
+          </a:p>
+        </p:txBody>
+      </p:sp>
+      <p:sp>
+        <p:nvSpPr>
+          <p:cNvPr id="3" name="Content Placeholder 2"/>
+          <p:cNvSpPr>
+            <a:spLocks noGrp="1"/>
+          </p:cNvSpPr>
+          <p:nvPr>
+            <p:ph idx="1"/>
+          </p:nvPr>
+        </p:nvSpPr>
+        <p:spPr/>
+        <p:txBody>
+          <a:bodyPr/>
+          <a:lstStyle/>
+          <a:p>
+            <a:r>
+              <a:rPr lang="en-US" dirty="0">
+                <a:hlinkClick r:id="rId2"/>
+              </a:rPr>
+              <a:t>j</a:t>
+            </a:r>
+            <a:r>
+              <a:rPr lang="en-US" dirty="0" smtClean="0">
+                <a:hlinkClick r:id="rId2"/>
+              </a:rPr>
+              <a:t>ohn.mcalister@ricoh-usa.com</a:t>
+            </a:r>
+            <a:endParaRPr lang="en-US" dirty="0"/>
+          </a:p>
+          <a:p>
+            <a:r>
+              <a:rPr lang="en-US" dirty="0" err="1" smtClean="0"/>
+              <a:t>github.com</a:t>
+            </a:r>
+            <a:r>
+              <a:rPr lang="en-US" dirty="0"/>
+              <a:t>/</a:t>
+            </a:r>
+            <a:r>
+              <a:rPr lang="en-US" dirty="0" err="1"/>
+              <a:t>maccergit</a:t>
+            </a:r>
+            <a:r>
+              <a:rPr lang="en-US" dirty="0"/>
+              <a:t>/python-</a:t>
+            </a:r>
+            <a:r>
+              <a:rPr lang="en-US" dirty="0" smtClean="0"/>
+              <a:t>talk</a:t>
+            </a:r>
+          </a:p>
+          <a:p>
+            <a:r>
+              <a:rPr lang="en-US" dirty="0" err="1" smtClean="0"/>
+              <a:t>Meetup</a:t>
+            </a:r>
+            <a:endParaRPr lang="en-US" dirty="0" smtClean="0"/>
+          </a:p>
+        </p:txBody>
+      </p:sp>
+    </p:spTree>
+    <p:extLst>
+      <p:ext uri="{BB962C8B-B14F-4D97-AF65-F5344CB8AC3E}">
+        <p14:creationId xmlns:p14="http://schemas.microsoft.com/office/powerpoint/2010/main" val="3482324218"/>
+      </p:ext>
+    </p:extLst>
+  </p:cSld>
+  <p:clrMapOvr>
+    <a:masterClrMapping/>
+  </p:clrMapOvr>
+  <p:timing>
+    <p:tnLst>
+      <p:par>
+        <p:cTn xmlns:p14="http://schemas.microsoft.com/office/powerpoint/2010/main" id="1" dur="indefinite" restart="never" nodeType="tmRoot"/>
+      </p:par>
+    </p:tnLst>
+  </p:timing>
+</p:sld>
+</file>
+
+<file path=ppt/slides/slide14.xml><?xml version="1.0" encoding="utf-8"?>
+<p:sld xmlns:a="http://schemas.openxmlformats.org/drawingml/2006/main" xmlns:r="http://schemas.openxmlformats.org/officeDocument/2006/relationships" xmlns:p="http://schemas.openxmlformats.org/presentationml/2006/main">
+  <p:cSld>
+    <p:spTree>
+      <p:nvGrpSpPr>
+        <p:cNvPr id="1" name=""/>
+        <p:cNvGrpSpPr/>
+        <p:nvPr/>
+      </p:nvGrpSpPr>
+      <p:grpSpPr>
+        <a:xfrm>
+          <a:off x="0" y="0"/>
+          <a:ext cx="0" cy="0"/>
+          <a:chOff x="0" y="0"/>
+          <a:chExt cx="0" cy="0"/>
+        </a:xfrm>
+      </p:grpSpPr>
+      <p:sp>
+        <p:nvSpPr>
+          <p:cNvPr id="2" name="Title 1"/>
+          <p:cNvSpPr>
+            <a:spLocks noGrp="1"/>
+          </p:cNvSpPr>
+          <p:nvPr>
+            <p:ph type="title"/>
+          </p:nvPr>
+        </p:nvSpPr>
+        <p:spPr/>
+        <p:txBody>
+          <a:bodyPr/>
+          <a:lstStyle/>
+          <a:p>
+            <a:r>
+              <a:rPr lang="en-US" dirty="0" smtClean="0"/>
+              <a:t>Questions?</a:t>
+            </a:r>
+            <a:endParaRPr lang="en-US" dirty="0"/>
+          </a:p>
+        </p:txBody>
+      </p:sp>
+      <p:sp>
+        <p:nvSpPr>
+          <p:cNvPr id="3" name="Content Placeholder 2"/>
+          <p:cNvSpPr>
+            <a:spLocks noGrp="1"/>
+          </p:cNvSpPr>
+          <p:nvPr>
+            <p:ph idx="1"/>
+          </p:nvPr>
+        </p:nvSpPr>
+        <p:spPr/>
+        <p:txBody>
+          <a:bodyPr>
+            <a:noAutofit/>
+          </a:bodyPr>
+          <a:lstStyle/>
+          <a:p>
+            <a:pPr marL="0" indent="0" algn="ctr">
+              <a:buNone/>
+            </a:pPr>
+            <a:r>
+              <a:rPr lang="en-US" sz="28800" dirty="0">
+                <a:latin typeface="Curlz MT"/>
+              </a:rPr>
+              <a:t>?</a:t>
+            </a:r>
+          </a:p>
+        </p:txBody>
+      </p:sp>
+    </p:spTree>
+    <p:extLst>
+      <p:ext uri="{BB962C8B-B14F-4D97-AF65-F5344CB8AC3E}">
+        <p14:creationId xmlns:p14="http://schemas.microsoft.com/office/powerpoint/2010/main" val="383939595"/>
+      </p:ext>
+    </p:extLst>
+  </p:cSld>
+  <p:clrMapOvr>
+    <a:masterClrMapping/>
+  </p:clrMapOvr>
+  <p:timing>
+    <p:tnLst>
+      <p:par>
+        <p:cTn xmlns:p14="http://schemas.microsoft.com/office/powerpoint/2010/main" id="1" dur="indefinite" restart="never" nodeType="tmRoot"/>
+      </p:par>
+    </p:tnLst>
+  </p:timing>
 </p:sld>
 </file>
 
@@ -3855,6 +4391,13 @@
   <p:clrMapOvr>
     <a:masterClrMapping/>
   </p:clrMapOvr>
+  <p:timing>
+    <p:tnLst>
+      <p:par>
+        <p:cTn xmlns:p14="http://schemas.microsoft.com/office/powerpoint/2010/main" id="1" dur="indefinite" restart="never" nodeType="tmRoot"/>
+      </p:par>
+    </p:tnLst>
+  </p:timing>
 </p:sld>
 </file>
 
@@ -3963,6 +4506,13 @@
   <p:clrMapOvr>
     <a:masterClrMapping/>
   </p:clrMapOvr>
+  <p:timing>
+    <p:tnLst>
+      <p:par>
+        <p:cTn xmlns:p14="http://schemas.microsoft.com/office/powerpoint/2010/main" id="1" dur="indefinite" restart="never" nodeType="tmRoot"/>
+      </p:par>
+    </p:tnLst>
+  </p:timing>
 </p:sld>
 </file>
 
@@ -4055,6 +4605,13 @@
   <p:clrMapOvr>
     <a:masterClrMapping/>
   </p:clrMapOvr>
+  <p:timing>
+    <p:tnLst>
+      <p:par>
+        <p:cTn xmlns:p14="http://schemas.microsoft.com/office/powerpoint/2010/main" id="1" dur="indefinite" restart="never" nodeType="tmRoot"/>
+      </p:par>
+    </p:tnLst>
+  </p:timing>
 </p:sld>
 </file>
 
@@ -4175,6 +4732,13 @@
   <p:clrMapOvr>
     <a:masterClrMapping/>
   </p:clrMapOvr>
+  <p:timing>
+    <p:tnLst>
+      <p:par>
+        <p:cTn xmlns:p14="http://schemas.microsoft.com/office/powerpoint/2010/main" id="1" dur="indefinite" restart="never" nodeType="tmRoot"/>
+      </p:par>
+    </p:tnLst>
+  </p:timing>
 </p:sld>
 </file>
 
@@ -4235,22 +4799,34 @@
           <a:p>
             <a:r>
               <a:rPr lang="en-US" dirty="0" smtClean="0"/>
-              <a:t>Just needed a way to know if different approaches to solving problem at hand was better than another </a:t>
-            </a:r>
-            <a:r>
-              <a:rPr lang="en-US" dirty="0" smtClean="0"/>
-              <a:t>approach</a:t>
+              <a:t>Just needed a way to know if different approaches to solving problem </a:t>
+            </a:r>
+            <a:r>
+              <a:rPr lang="en-US" dirty="0" smtClean="0"/>
+              <a:t>performed any better</a:t>
             </a:r>
             <a:endParaRPr lang="en-US" dirty="0" smtClean="0"/>
           </a:p>
           <a:p>
             <a:r>
               <a:rPr lang="en-US" dirty="0" smtClean="0"/>
-              <a:t>Most of these tests are CPU bound in tight loops – want to remove one time overhead, and test true execution </a:t>
-            </a:r>
-            <a:r>
-              <a:rPr lang="en-US" dirty="0" smtClean="0"/>
-              <a:t>performance</a:t>
+              <a:t>Mostly </a:t>
+            </a:r>
+            <a:r>
+              <a:rPr lang="en-US" dirty="0" smtClean="0"/>
+              <a:t>CPU bound in tight loops – want to </a:t>
+            </a:r>
+            <a:r>
+              <a:rPr lang="en-US" dirty="0" smtClean="0"/>
+              <a:t>test </a:t>
+            </a:r>
+            <a:r>
+              <a:rPr lang="en-US" dirty="0" smtClean="0"/>
+              <a:t>true execution </a:t>
+            </a:r>
+            <a:r>
+              <a:rPr lang="en-US" dirty="0" smtClean="0"/>
+              <a:t>performance and ignore overhead</a:t>
             </a:r>
             <a:endParaRPr lang="en-US" dirty="0" smtClean="0"/>
           </a:p>
@@ -4265,11 +4841,7 @@
             </a:r>
             <a:r>
               <a:rPr lang="en-US" dirty="0" smtClean="0"/>
-              <a:t>” to run several iterations and report total </a:t>
-            </a:r>
-            <a:r>
-              <a:rPr lang="en-US" dirty="0" smtClean="0"/>
-              <a:t>time</a:t>
+              <a:t>” to run several iterations and report total time</a:t>
             </a:r>
           </a:p>
           <a:p>
@@ -4291,6 +4863,13 @@
   <p:clrMapOvr>
     <a:masterClrMapping/>
   </p:clrMapOvr>
+  <p:timing>
+    <p:tnLst>
+      <p:par>
+        <p:cTn xmlns:p14="http://schemas.microsoft.com/office/powerpoint/2010/main" id="1" dur="indefinite" restart="never" nodeType="tmRoot"/>
+      </p:par>
+    </p:tnLst>
+  </p:timing>
 </p:sld>
 </file>
 
@@ -4351,8 +4930,48 @@
           <a:p>
             <a:r>
               <a:rPr lang="en-US" dirty="0" smtClean="0"/>
-              <a:t>prob001 – trivial in Python</a:t>
-            </a:r>
+              <a:t>prob001 – trivial in </a:t>
+            </a:r>
+            <a:r>
+              <a:rPr lang="en-US" dirty="0" smtClean="0"/>
+              <a:t>Python</a:t>
+            </a:r>
+          </a:p>
+          <a:p>
+            <a:pPr lvl="1"/>
+            <a:r>
+              <a:rPr lang="en-US" dirty="0" err="1" smtClean="0"/>
+              <a:t>CPython</a:t>
+            </a:r>
+            <a:r>
+              <a:rPr lang="en-US" dirty="0" smtClean="0"/>
+              <a:t> : 127 </a:t>
+            </a:r>
+            <a:r>
+              <a:rPr lang="en-US" dirty="0" smtClean="0"/>
+              <a:t>µsec, </a:t>
+            </a:r>
+            <a:r>
+              <a:rPr lang="en-US" dirty="0" err="1" smtClean="0"/>
+              <a:t>Jython</a:t>
+            </a:r>
+            <a:r>
+              <a:rPr lang="en-US" dirty="0" smtClean="0"/>
+              <a:t> : 76 µsec</a:t>
+            </a:r>
+            <a:r>
+              <a:rPr lang="en-US" dirty="0" smtClean="0"/>
+              <a:t>, </a:t>
+            </a:r>
+            <a:r>
+              <a:rPr lang="en-US" dirty="0" err="1" smtClean="0"/>
+              <a:t>PyPy</a:t>
+            </a:r>
+            <a:r>
+              <a:rPr lang="en-US" dirty="0" smtClean="0"/>
+              <a:t> : 33 µsec</a:t>
+            </a:r>
+            <a:endParaRPr lang="en-US" dirty="0" smtClean="0"/>
           </a:p>
           <a:p>
             <a:r>
@@ -4361,11 +4980,145 @@
             </a:r>
             <a:r>
               <a:rPr lang="en-US" dirty="0" smtClean="0"/>
-              <a:t>rob003 – first version is pure Python, second uses </a:t>
-            </a:r>
+              <a:t>rob016 – power example from earlier</a:t>
+            </a:r>
+          </a:p>
+          <a:p>
+            <a:pPr lvl="1"/>
             <a:r>
               <a:rPr lang="en-US" dirty="0" err="1" smtClean="0"/>
-              <a:t>sympy</a:t>
+              <a:t>CPython</a:t>
+            </a:r>
+            <a:r>
+              <a:rPr lang="en-US" dirty="0" smtClean="0"/>
+              <a:t> : 164 µsec, </a:t>
+            </a:r>
+            <a:r>
+              <a:rPr lang="en-US" dirty="0" err="1" smtClean="0"/>
+              <a:t>Jython</a:t>
+            </a:r>
+            <a:r>
+              <a:rPr lang="en-US" dirty="0" smtClean="0"/>
+              <a:t> : 61 µsec, </a:t>
+            </a:r>
+            <a:r>
+              <a:rPr lang="en-US" dirty="0" err="1" smtClean="0"/>
+              <a:t>PyPy</a:t>
+            </a:r>
+            <a:r>
+              <a:rPr lang="en-US" dirty="0" smtClean="0"/>
+              <a:t> : 12 µsec</a:t>
+            </a:r>
+          </a:p>
+          <a:p>
+            <a:r>
+              <a:rPr lang="en-US" dirty="0"/>
+              <a:t>p</a:t>
+            </a:r>
+            <a:r>
+              <a:rPr lang="en-US" dirty="0" smtClean="0"/>
+              <a:t>rob048 – another one made trivial by Python</a:t>
+            </a:r>
+          </a:p>
+          <a:p>
+            <a:pPr lvl="1"/>
+            <a:r>
+              <a:rPr lang="en-US" dirty="0" smtClean="0"/>
+              <a:t>Convert result to string and take last 10 chars</a:t>
+            </a:r>
+          </a:p>
+          <a:p>
+            <a:pPr lvl="2"/>
+            <a:r>
+              <a:rPr lang="en-US" dirty="0" err="1" smtClean="0"/>
+              <a:t>CPython</a:t>
+            </a:r>
+            <a:r>
+              <a:rPr lang="en-US" dirty="0" smtClean="0"/>
+              <a:t> : 10 </a:t>
+            </a:r>
+            <a:r>
+              <a:rPr lang="en-US" dirty="0" err="1" smtClean="0"/>
+              <a:t>ms</a:t>
+            </a:r>
+            <a:r>
+              <a:rPr lang="en-US" dirty="0" smtClean="0"/>
+              <a:t>, </a:t>
+            </a:r>
+            <a:r>
+              <a:rPr lang="en-US" dirty="0" err="1" smtClean="0"/>
+              <a:t>Jython</a:t>
+            </a:r>
+            <a:r>
+              <a:rPr lang="en-US" dirty="0" smtClean="0"/>
+              <a:t> : 7 </a:t>
+            </a:r>
+            <a:r>
+              <a:rPr lang="en-US" dirty="0" err="1" smtClean="0"/>
+              <a:t>ms</a:t>
+            </a:r>
+            <a:r>
+              <a:rPr lang="en-US" dirty="0" smtClean="0"/>
+              <a:t>, </a:t>
+            </a:r>
+            <a:r>
+              <a:rPr lang="en-US" dirty="0" err="1" smtClean="0"/>
+              <a:t>PyPy</a:t>
+            </a:r>
+            <a:r>
+              <a:rPr lang="en-US" dirty="0" smtClean="0"/>
+              <a:t> : 5 </a:t>
+            </a:r>
+            <a:r>
+              <a:rPr lang="en-US" dirty="0" err="1" smtClean="0"/>
+              <a:t>ms</a:t>
+            </a:r>
+            <a:endParaRPr lang="en-US" dirty="0" smtClean="0"/>
+          </a:p>
+          <a:p>
+            <a:pPr lvl="1"/>
+            <a:r>
+              <a:rPr lang="en-US" dirty="0" smtClean="0"/>
+              <a:t>Take modulo 10^10 of result</a:t>
+            </a:r>
+          </a:p>
+          <a:p>
+            <a:pPr lvl="2"/>
+            <a:r>
+              <a:rPr lang="en-US" dirty="0" err="1" smtClean="0"/>
+              <a:t>CPython</a:t>
+            </a:r>
+            <a:r>
+              <a:rPr lang="en-US" dirty="0" smtClean="0"/>
+              <a:t> : 10 </a:t>
+            </a:r>
+            <a:r>
+              <a:rPr lang="en-US" dirty="0" err="1" smtClean="0"/>
+              <a:t>ms</a:t>
+            </a:r>
+            <a:r>
+              <a:rPr lang="en-US" dirty="0" smtClean="0"/>
+              <a:t>, </a:t>
+            </a:r>
+            <a:r>
+              <a:rPr lang="en-US" dirty="0" err="1" smtClean="0"/>
+              <a:t>Jython</a:t>
+            </a:r>
+            <a:r>
+              <a:rPr lang="en-US" dirty="0" smtClean="0"/>
+              <a:t> : 7 </a:t>
+            </a:r>
+            <a:r>
+              <a:rPr lang="en-US" dirty="0" err="1" smtClean="0"/>
+              <a:t>ms</a:t>
+            </a:r>
+            <a:r>
+              <a:rPr lang="en-US" dirty="0" smtClean="0"/>
+              <a:t>, </a:t>
+            </a:r>
+            <a:r>
+              <a:rPr lang="en-US" dirty="0" err="1" smtClean="0"/>
+              <a:t>PyPy</a:t>
             </a:r>
             <a:r>
               <a:rPr lang="en-US" dirty="0"/>
@@ -4373,25 +5126,13 @@
             </a:r>
             <a:r>
               <a:rPr lang="en-US" dirty="0" smtClean="0"/>
-              <a:t>– but </a:t>
+              <a:t>: 5 </a:t>
             </a:r>
             <a:r>
               <a:rPr lang="en-US" dirty="0" err="1" smtClean="0"/>
-              <a:t>sympy</a:t>
-            </a:r>
-            <a:r>
-              <a:rPr lang="en-US" dirty="0"/>
-              <a:t> </a:t>
-            </a:r>
-            <a:r>
-              <a:rPr lang="en-US" dirty="0" smtClean="0"/>
-              <a:t>only available in </a:t>
-            </a:r>
-            <a:r>
-              <a:rPr lang="en-US" smtClean="0"/>
-              <a:t>CPython</a:t>
-            </a:r>
-            <a:endParaRPr lang="en-US" dirty="0"/>
+              <a:t>ms</a:t>
+            </a:r>
+            <a:endParaRPr lang="en-US" dirty="0" smtClean="0"/>
           </a:p>
         </p:txBody>
       </p:sp>
@@ -4405,6 +5146,243 @@
   <p:clrMapOvr>
     <a:masterClrMapping/>
   </p:clrMapOvr>
+  <p:timing>
+    <p:tnLst>
+      <p:par>
+        <p:cTn xmlns:p14="http://schemas.microsoft.com/office/powerpoint/2010/main" id="1" dur="indefinite" restart="never" nodeType="tmRoot"/>
+      </p:par>
+    </p:tnLst>
+  </p:timing>
+</p:sld>
+</file>
+
+<file path=ppt/slides/slide8.xml><?xml version="1.0" encoding="utf-8"?>
+<p:sld xmlns:a="http://schemas.openxmlformats.org/drawingml/2006/main" xmlns:r="http://schemas.openxmlformats.org/officeDocument/2006/relationships" xmlns:p="http://schemas.openxmlformats.org/presentationml/2006/main">
+  <p:cSld>
+    <p:spTree>
+      <p:nvGrpSpPr>
+        <p:cNvPr id="1" name=""/>
+        <p:cNvGrpSpPr/>
+        <p:nvPr/>
+      </p:nvGrpSpPr>
+      <p:grpSpPr>
+        <a:xfrm>
+          <a:off x="0" y="0"/>
+          <a:ext cx="0" cy="0"/>
+          <a:chOff x="0" y="0"/>
+          <a:chExt cx="0" cy="0"/>
+        </a:xfrm>
+      </p:grpSpPr>
+      <p:sp>
+        <p:nvSpPr>
+          <p:cNvPr id="2" name="Title 1"/>
+          <p:cNvSpPr>
+            <a:spLocks noGrp="1"/>
+          </p:cNvSpPr>
+          <p:nvPr>
+            <p:ph type="title"/>
+          </p:nvPr>
+        </p:nvSpPr>
+        <p:spPr/>
+        <p:txBody>
+          <a:bodyPr/>
+          <a:lstStyle/>
+          <a:p>
+            <a:r>
+              <a:rPr lang="en-US" dirty="0" smtClean="0"/>
+              <a:t>Python Modules</a:t>
+            </a:r>
+            <a:endParaRPr lang="en-US" dirty="0"/>
+          </a:p>
+        </p:txBody>
+      </p:sp>
+      <p:sp>
+        <p:nvSpPr>
+          <p:cNvPr id="3" name="Content Placeholder 2"/>
+          <p:cNvSpPr>
+            <a:spLocks noGrp="1"/>
+          </p:cNvSpPr>
+          <p:nvPr>
+            <p:ph idx="1"/>
+          </p:nvPr>
+        </p:nvSpPr>
+        <p:spPr/>
+        <p:txBody>
+          <a:bodyPr/>
+          <a:lstStyle/>
+          <a:p>
+            <a:r>
+              <a:rPr lang="en-US" dirty="0" err="1" smtClean="0"/>
+              <a:t>SymPy</a:t>
+            </a:r>
+            <a:r>
+              <a:rPr lang="en-US" dirty="0" smtClean="0"/>
+              <a:t> – prime number support</a:t>
+            </a:r>
+          </a:p>
+          <a:p>
+            <a:pPr lvl="1"/>
+            <a:r>
+              <a:rPr lang="en-US" dirty="0" smtClean="0"/>
+              <a:t>prob003 – </a:t>
+            </a:r>
+            <a:r>
+              <a:rPr lang="en-US" dirty="0" err="1" smtClean="0"/>
+              <a:t>primefactors</a:t>
+            </a:r>
+            <a:endParaRPr lang="en-US" dirty="0" smtClean="0"/>
+          </a:p>
+          <a:p>
+            <a:pPr lvl="1"/>
+            <a:r>
+              <a:rPr lang="en-US" dirty="0"/>
+              <a:t>p</a:t>
+            </a:r>
+            <a:r>
+              <a:rPr lang="en-US" dirty="0" smtClean="0"/>
+              <a:t>rob007 – prime</a:t>
+            </a:r>
+          </a:p>
+          <a:p>
+            <a:r>
+              <a:rPr lang="en-US" dirty="0" err="1"/>
+              <a:t>d</a:t>
+            </a:r>
+            <a:r>
+              <a:rPr lang="en-US" dirty="0" err="1" smtClean="0"/>
+              <a:t>atetime</a:t>
+            </a:r>
+            <a:r>
+              <a:rPr lang="en-US" dirty="0" smtClean="0"/>
+              <a:t> – date/time arithmetic</a:t>
+            </a:r>
+          </a:p>
+          <a:p>
+            <a:pPr lvl="1"/>
+            <a:r>
+              <a:rPr lang="en-US" dirty="0"/>
+              <a:t>p</a:t>
+            </a:r>
+            <a:r>
+              <a:rPr lang="en-US" dirty="0" smtClean="0"/>
+              <a:t>rob019 – built in calendar</a:t>
+            </a:r>
+          </a:p>
+          <a:p>
+            <a:r>
+              <a:rPr lang="en-US" dirty="0" smtClean="0"/>
+              <a:t>Modules can be much faster and easier to read – use them!</a:t>
+            </a:r>
+          </a:p>
+          <a:p>
+            <a:endParaRPr lang="en-US" dirty="0"/>
+          </a:p>
+        </p:txBody>
+      </p:sp>
+    </p:spTree>
+    <p:extLst>
+      <p:ext uri="{BB962C8B-B14F-4D97-AF65-F5344CB8AC3E}">
+        <p14:creationId xmlns:p14="http://schemas.microsoft.com/office/powerpoint/2010/main" val="3347877831"/>
+      </p:ext>
+    </p:extLst>
+  </p:cSld>
+  <p:clrMapOvr>
+    <a:masterClrMapping/>
+  </p:clrMapOvr>
+  <p:timing>
+    <p:tnLst>
+      <p:par>
+        <p:cTn xmlns:p14="http://schemas.microsoft.com/office/powerpoint/2010/main" id="1" dur="indefinite" restart="never" nodeType="tmRoot"/>
+      </p:par>
+    </p:tnLst>
+  </p:timing>
+</p:sld>
+</file>
+
+<file path=ppt/slides/slide9.xml><?xml version="1.0" encoding="utf-8"?>
+<p:sld xmlns:a="http://schemas.openxmlformats.org/drawingml/2006/main" xmlns:r="http://schemas.openxmlformats.org/officeDocument/2006/relationships" xmlns:p="http://schemas.openxmlformats.org/presentationml/2006/main">
+  <p:cSld>
+    <p:spTree>
+      <p:nvGrpSpPr>
+        <p:cNvPr id="1" name=""/>
+        <p:cNvGrpSpPr/>
+        <p:nvPr/>
+      </p:nvGrpSpPr>
+      <p:grpSpPr>
+        <a:xfrm>
+          <a:off x="0" y="0"/>
+          <a:ext cx="0" cy="0"/>
+          <a:chOff x="0" y="0"/>
+          <a:chExt cx="0" cy="0"/>
+        </a:xfrm>
+      </p:grpSpPr>
+      <p:sp>
+        <p:nvSpPr>
+          <p:cNvPr id="2" name="Title 1"/>
+          <p:cNvSpPr>
+            <a:spLocks noGrp="1"/>
+          </p:cNvSpPr>
+          <p:nvPr>
+            <p:ph type="title"/>
+          </p:nvPr>
+        </p:nvSpPr>
+        <p:spPr/>
+        <p:txBody>
+          <a:bodyPr/>
+          <a:lstStyle/>
+          <a:p>
+            <a:r>
+              <a:rPr lang="en-US" dirty="0" smtClean="0"/>
+              <a:t>Algorithms</a:t>
+            </a:r>
+            <a:endParaRPr lang="en-US" dirty="0"/>
+          </a:p>
+        </p:txBody>
+      </p:sp>
+      <p:sp>
+        <p:nvSpPr>
+          <p:cNvPr id="3" name="Content Placeholder 2"/>
+          <p:cNvSpPr>
+            <a:spLocks noGrp="1"/>
+          </p:cNvSpPr>
+          <p:nvPr>
+            <p:ph idx="1"/>
+          </p:nvPr>
+        </p:nvSpPr>
+        <p:spPr/>
+        <p:txBody>
+          <a:bodyPr/>
+          <a:lstStyle/>
+          <a:p>
+            <a:r>
+              <a:rPr lang="en-US" dirty="0"/>
+              <a:t>B</a:t>
+            </a:r>
+            <a:r>
+              <a:rPr lang="en-US" dirty="0" smtClean="0"/>
+              <a:t>etter algorithms yield biggest payoff</a:t>
+            </a:r>
+            <a:endParaRPr lang="en-US" dirty="0"/>
+          </a:p>
+        </p:txBody>
+      </p:sp>
+    </p:spTree>
+    <p:extLst>
+      <p:ext uri="{BB962C8B-B14F-4D97-AF65-F5344CB8AC3E}">
+        <p14:creationId xmlns:p14="http://schemas.microsoft.com/office/powerpoint/2010/main" val="2151259301"/>
+      </p:ext>
+    </p:extLst>
+  </p:cSld>
+  <p:clrMapOvr>
+    <a:masterClrMapping/>
+  </p:clrMapOvr>
+  <p:timing>
+    <p:tnLst>
+      <p:par>
+        <p:cTn xmlns:p14="http://schemas.microsoft.com/office/powerpoint/2010/main" id="1" dur="indefinite" restart="never" nodeType="tmRoot"/>
+      </p:par>
+    </p:tnLst>
+  </p:timing>
 </p:sld>
 </file>
 

</xml_diff>

<commit_message>
fill in modules slides, add skeleton of surprises slide
</commit_message>
<xml_diff>
--- a/Python Performance Talk.pptx
+++ b/Python Performance Talk.pptx
@@ -13,12 +13,13 @@
     <p:sldId id="261" r:id="rId7"/>
     <p:sldId id="262" r:id="rId8"/>
     <p:sldId id="263" r:id="rId9"/>
-    <p:sldId id="264" r:id="rId10"/>
-    <p:sldId id="266" r:id="rId11"/>
-    <p:sldId id="265" r:id="rId12"/>
-    <p:sldId id="269" r:id="rId13"/>
-    <p:sldId id="268" r:id="rId14"/>
-    <p:sldId id="267" r:id="rId15"/>
+    <p:sldId id="270" r:id="rId10"/>
+    <p:sldId id="264" r:id="rId11"/>
+    <p:sldId id="266" r:id="rId12"/>
+    <p:sldId id="265" r:id="rId13"/>
+    <p:sldId id="269" r:id="rId14"/>
+    <p:sldId id="268" r:id="rId15"/>
+    <p:sldId id="267" r:id="rId16"/>
   </p:sldIdLst>
   <p:sldSz cx="9144000" cy="6858000" type="screen4x3"/>
   <p:notesSz cx="6858000" cy="9144000"/>
@@ -403,7 +404,7 @@
           <a:p>
             <a:fld id="{B01F9CA3-105E-4857-9057-6DB6197DA786}" type="datetimeFigureOut">
               <a:rPr lang="en-US" smtClean="0"/>
-              <a:t>4/23/17</a:t>
+              <a:t>4/25/17</a:t>
             </a:fld>
             <a:endParaRPr lang="en-US"/>
           </a:p>
@@ -595,7 +596,7 @@
           <a:p>
             <a:fld id="{B01F9CA3-105E-4857-9057-6DB6197DA786}" type="datetimeFigureOut">
               <a:rPr lang="en-US" smtClean="0"/>
-              <a:t>4/23/17</a:t>
+              <a:t>4/25/17</a:t>
             </a:fld>
             <a:endParaRPr lang="en-US"/>
           </a:p>
@@ -864,7 +865,7 @@
           <a:p>
             <a:fld id="{B01F9CA3-105E-4857-9057-6DB6197DA786}" type="datetimeFigureOut">
               <a:rPr lang="en-US" smtClean="0"/>
-              <a:t>4/23/17</a:t>
+              <a:t>4/25/17</a:t>
             </a:fld>
             <a:endParaRPr lang="en-US"/>
           </a:p>
@@ -1043,7 +1044,7 @@
           <a:p>
             <a:fld id="{B01F9CA3-105E-4857-9057-6DB6197DA786}" type="datetimeFigureOut">
               <a:rPr lang="en-US" smtClean="0"/>
-              <a:t>4/23/17</a:t>
+              <a:t>4/25/17</a:t>
             </a:fld>
             <a:endParaRPr lang="en-US"/>
           </a:p>
@@ -1212,7 +1213,7 @@
           <a:p>
             <a:fld id="{B01F9CA3-105E-4857-9057-6DB6197DA786}" type="datetimeFigureOut">
               <a:rPr lang="en-US" smtClean="0"/>
-              <a:t>4/23/17</a:t>
+              <a:t>4/25/17</a:t>
             </a:fld>
             <a:endParaRPr lang="en-US"/>
           </a:p>
@@ -1454,7 +1455,7 @@
           <a:p>
             <a:fld id="{B01F9CA3-105E-4857-9057-6DB6197DA786}" type="datetimeFigureOut">
               <a:rPr lang="en-US" smtClean="0"/>
-              <a:t>4/23/17</a:t>
+              <a:t>4/25/17</a:t>
             </a:fld>
             <a:endParaRPr lang="en-US"/>
           </a:p>
@@ -1777,7 +1778,7 @@
           <a:p>
             <a:fld id="{B01F9CA3-105E-4857-9057-6DB6197DA786}" type="datetimeFigureOut">
               <a:rPr lang="en-US" smtClean="0"/>
-              <a:t>4/23/17</a:t>
+              <a:t>4/25/17</a:t>
             </a:fld>
             <a:endParaRPr lang="en-US"/>
           </a:p>
@@ -2075,7 +2076,7 @@
           <a:p>
             <a:fld id="{B01F9CA3-105E-4857-9057-6DB6197DA786}" type="datetimeFigureOut">
               <a:rPr lang="en-US" smtClean="0"/>
-              <a:t>4/23/17</a:t>
+              <a:t>4/25/17</a:t>
             </a:fld>
             <a:endParaRPr lang="en-US"/>
           </a:p>
@@ -2531,7 +2532,7 @@
           <a:p>
             <a:fld id="{B01F9CA3-105E-4857-9057-6DB6197DA786}" type="datetimeFigureOut">
               <a:rPr lang="en-US" smtClean="0"/>
-              <a:t>4/23/17</a:t>
+              <a:t>4/25/17</a:t>
             </a:fld>
             <a:endParaRPr lang="en-US"/>
           </a:p>
@@ -2644,7 +2645,7 @@
           <a:p>
             <a:fld id="{B01F9CA3-105E-4857-9057-6DB6197DA786}" type="datetimeFigureOut">
               <a:rPr lang="en-US" smtClean="0"/>
-              <a:t>4/23/17</a:t>
+              <a:t>4/25/17</a:t>
             </a:fld>
             <a:endParaRPr lang="en-US"/>
           </a:p>
@@ -2734,7 +2735,7 @@
           <a:p>
             <a:fld id="{B01F9CA3-105E-4857-9057-6DB6197DA786}" type="datetimeFigureOut">
               <a:rPr lang="en-US" smtClean="0"/>
-              <a:t>4/23/17</a:t>
+              <a:t>4/25/17</a:t>
             </a:fld>
             <a:endParaRPr lang="en-US"/>
           </a:p>
@@ -3016,7 +3017,7 @@
           <a:p>
             <a:fld id="{B01F9CA3-105E-4857-9057-6DB6197DA786}" type="datetimeFigureOut">
               <a:rPr lang="en-US" smtClean="0"/>
-              <a:t>4/23/17</a:t>
+              <a:t>4/25/17</a:t>
             </a:fld>
             <a:endParaRPr lang="en-US"/>
           </a:p>
@@ -3222,7 +3223,7 @@
           <a:p>
             <a:fld id="{B01F9CA3-105E-4857-9057-6DB6197DA786}" type="datetimeFigureOut">
               <a:rPr lang="en-US" smtClean="0"/>
-              <a:t>4/23/17</a:t>
+              <a:t>4/25/17</a:t>
             </a:fld>
             <a:endParaRPr lang="en-US"/>
           </a:p>
@@ -3806,7 +3807,7 @@
           <a:p>
             <a:r>
               <a:rPr lang="en-US" dirty="0" smtClean="0"/>
-              <a:t>Rosalind Sample</a:t>
+              <a:t>Algorithms</a:t>
             </a:r>
             <a:endParaRPr lang="en-US" dirty="0"/>
           </a:p>
@@ -3828,41 +3829,72 @@
           <a:lstStyle/>
           <a:p>
             <a:r>
-              <a:rPr lang="en-US" dirty="0" smtClean="0"/>
-              <a:t>BINS combines all of the above…</a:t>
-            </a:r>
-          </a:p>
-          <a:p>
-            <a:pPr lvl="1"/>
-            <a:r>
-              <a:rPr lang="en-US" dirty="0" smtClean="0"/>
-              <a:t>Brute force – “make it work…”</a:t>
-            </a:r>
-          </a:p>
-          <a:p>
-            <a:pPr lvl="1"/>
-            <a:r>
               <a:rPr lang="en-US" dirty="0"/>
-              <a:t>b</a:t>
-            </a:r>
-            <a:r>
-              <a:rPr lang="en-US" dirty="0" smtClean="0"/>
-              <a:t>isection module – “…then make it fast”</a:t>
-            </a:r>
-          </a:p>
-          <a:p>
-            <a:pPr lvl="1"/>
-            <a:r>
-              <a:rPr lang="en-US" dirty="0" smtClean="0"/>
-              <a:t>Hash lookup – using more memory allows faster algorithm – memory/speed tradeoff</a:t>
-            </a:r>
+              <a:t>B</a:t>
+            </a:r>
+            <a:r>
+              <a:rPr lang="en-US" dirty="0" smtClean="0"/>
+              <a:t>etter algorithms yield biggest </a:t>
+            </a:r>
+            <a:r>
+              <a:rPr lang="en-US" dirty="0" smtClean="0"/>
+              <a:t>payoff</a:t>
+            </a:r>
+          </a:p>
+          <a:p>
+            <a:r>
+              <a:rPr lang="en-US" dirty="0" smtClean="0"/>
+              <a:t>prob012 – use O(c) </a:t>
+            </a:r>
+            <a:r>
+              <a:rPr lang="en-US" dirty="0" err="1" smtClean="0"/>
+              <a:t>vs</a:t>
+            </a:r>
+            <a:r>
+              <a:rPr lang="en-US" dirty="0" smtClean="0"/>
+              <a:t> O(n)</a:t>
+            </a:r>
+          </a:p>
+          <a:p>
+            <a:r>
+              <a:rPr lang="en-US" dirty="0"/>
+              <a:t>p</a:t>
+            </a:r>
+            <a:r>
+              <a:rPr lang="en-US" dirty="0" smtClean="0"/>
+              <a:t>rob015 – </a:t>
+            </a:r>
+            <a:r>
+              <a:rPr lang="en-US" dirty="0" err="1" smtClean="0"/>
+              <a:t>memoization</a:t>
+            </a:r>
+            <a:endParaRPr lang="en-US" dirty="0" smtClean="0"/>
+          </a:p>
+          <a:p>
+            <a:r>
+              <a:rPr lang="en-US" dirty="0"/>
+              <a:t>p</a:t>
+            </a:r>
+            <a:r>
+              <a:rPr lang="en-US" dirty="0" smtClean="0"/>
+              <a:t>rob018, prob067 – O(n^2) </a:t>
+            </a:r>
+            <a:r>
+              <a:rPr lang="en-US" dirty="0" err="1" smtClean="0"/>
+              <a:t>vs</a:t>
+            </a:r>
+            <a:r>
+              <a:rPr lang="en-US" dirty="0" smtClean="0"/>
+              <a:t> O(2^n)</a:t>
+            </a:r>
+            <a:endParaRPr lang="en-US" dirty="0"/>
           </a:p>
         </p:txBody>
       </p:sp>
     </p:spTree>
     <p:extLst>
       <p:ext uri="{BB962C8B-B14F-4D97-AF65-F5344CB8AC3E}">
-        <p14:creationId xmlns:p14="http://schemas.microsoft.com/office/powerpoint/2010/main" val="2050719833"/>
+        <p14:creationId xmlns:p14="http://schemas.microsoft.com/office/powerpoint/2010/main" val="2151259301"/>
       </p:ext>
     </p:extLst>
   </p:cSld>
@@ -3913,7 +3945,7 @@
           <a:p>
             <a:r>
               <a:rPr lang="en-US" dirty="0" smtClean="0"/>
-              <a:t>Surprises</a:t>
+              <a:t>Rosalind Sample</a:t>
             </a:r>
             <a:endParaRPr lang="en-US" dirty="0"/>
           </a:p>
@@ -3936,34 +3968,40 @@
           <a:p>
             <a:r>
               <a:rPr lang="en-US" dirty="0" smtClean="0"/>
-              <a:t>Modules aren’t always faster</a:t>
-            </a:r>
-          </a:p>
-          <a:p>
-            <a:r>
-              <a:rPr lang="en-US" dirty="0" err="1" smtClean="0"/>
-              <a:t>Jython</a:t>
-            </a:r>
-            <a:r>
-              <a:rPr lang="en-US" dirty="0" smtClean="0"/>
-              <a:t> and </a:t>
-            </a:r>
-            <a:r>
-              <a:rPr lang="en-US" dirty="0" err="1" smtClean="0"/>
-              <a:t>PyPy</a:t>
-            </a:r>
-            <a:r>
-              <a:rPr lang="en-US" dirty="0" smtClean="0"/>
-              <a:t> aren’t always faster</a:t>
-            </a:r>
-            <a:endParaRPr lang="en-US" dirty="0"/>
+              <a:t>BINS combines all of the above…</a:t>
+            </a:r>
+          </a:p>
+          <a:p>
+            <a:pPr lvl="1"/>
+            <a:r>
+              <a:rPr lang="en-US" dirty="0" smtClean="0"/>
+              <a:t>Brute force – “make it work…”</a:t>
+            </a:r>
+          </a:p>
+          <a:p>
+            <a:pPr lvl="1"/>
+            <a:r>
+              <a:rPr lang="en-US" dirty="0"/>
+              <a:t>b</a:t>
+            </a:r>
+            <a:r>
+              <a:rPr lang="en-US" dirty="0" smtClean="0"/>
+              <a:t>isection module – “…then make it fast”</a:t>
+            </a:r>
+          </a:p>
+          <a:p>
+            <a:pPr lvl="1"/>
+            <a:r>
+              <a:rPr lang="en-US" dirty="0" smtClean="0"/>
+              <a:t>Hash lookup – using more memory allows faster algorithm – memory/speed tradeoff</a:t>
+            </a:r>
           </a:p>
         </p:txBody>
       </p:sp>
     </p:spTree>
     <p:extLst>
       <p:ext uri="{BB962C8B-B14F-4D97-AF65-F5344CB8AC3E}">
-        <p14:creationId xmlns:p14="http://schemas.microsoft.com/office/powerpoint/2010/main" val="195785376"/>
+        <p14:creationId xmlns:p14="http://schemas.microsoft.com/office/powerpoint/2010/main" val="2050719833"/>
       </p:ext>
     </p:extLst>
   </p:cSld>
@@ -4014,7 +4052,7 @@
           <a:p>
             <a:r>
               <a:rPr lang="en-US" dirty="0" smtClean="0"/>
-              <a:t>Sailing Over the Edge</a:t>
+              <a:t>Surprises</a:t>
             </a:r>
             <a:endParaRPr lang="en-US" dirty="0"/>
           </a:p>
@@ -4036,33 +4074,39 @@
           <a:lstStyle/>
           <a:p>
             <a:r>
-              <a:rPr lang="en-US" dirty="0" err="1" smtClean="0"/>
-              <a:t>Cython</a:t>
+              <a:rPr lang="en-US" dirty="0" smtClean="0"/>
+              <a:t>Modules aren’t always </a:t>
+            </a:r>
+            <a:r>
+              <a:rPr lang="en-US" dirty="0" smtClean="0"/>
+              <a:t>faster : prob009, prob028</a:t>
             </a:r>
             <a:endParaRPr lang="en-US" dirty="0" smtClean="0"/>
           </a:p>
           <a:p>
-            <a:r>
-              <a:rPr lang="en-US" dirty="0" smtClean="0"/>
-              <a:t>Multiprocessing</a:t>
-            </a:r>
-          </a:p>
-          <a:p>
-            <a:pPr lvl="1"/>
-            <a:r>
-              <a:rPr lang="en-US" dirty="0" smtClean="0"/>
-              <a:t>The GIL</a:t>
-            </a:r>
-          </a:p>
-          <a:p>
-            <a:pPr lvl="1"/>
             <a:r>
               <a:rPr lang="en-US" dirty="0" err="1" smtClean="0"/>
               <a:t>Jython</a:t>
             </a:r>
             <a:r>
               <a:rPr lang="en-US" dirty="0" smtClean="0"/>
-              <a:t> – no GIL – true multithreading</a:t>
+              <a:t> and </a:t>
+            </a:r>
+            <a:r>
+              <a:rPr lang="en-US" dirty="0" err="1" smtClean="0"/>
+              <a:t>PyPy</a:t>
+            </a:r>
+            <a:r>
+              <a:rPr lang="en-US" dirty="0" smtClean="0"/>
+              <a:t> aren’t always </a:t>
+            </a:r>
+            <a:r>
+              <a:rPr lang="en-US" dirty="0" smtClean="0"/>
+              <a:t>faster </a:t>
+            </a:r>
+            <a:r>
+              <a:rPr lang="en-US" smtClean="0"/>
+              <a:t>: prob040</a:t>
             </a:r>
             <a:endParaRPr lang="en-US" dirty="0"/>
           </a:p>
@@ -4071,13 +4115,20 @@
     </p:spTree>
     <p:extLst>
       <p:ext uri="{BB962C8B-B14F-4D97-AF65-F5344CB8AC3E}">
-        <p14:creationId xmlns:p14="http://schemas.microsoft.com/office/powerpoint/2010/main" val="3906047054"/>
+        <p14:creationId xmlns:p14="http://schemas.microsoft.com/office/powerpoint/2010/main" val="195785376"/>
       </p:ext>
     </p:extLst>
   </p:cSld>
   <p:clrMapOvr>
     <a:masterClrMapping/>
   </p:clrMapOvr>
+  <p:timing>
+    <p:tnLst>
+      <p:par>
+        <p:cTn xmlns:p14="http://schemas.microsoft.com/office/powerpoint/2010/main" id="1" dur="indefinite" restart="never" nodeType="tmRoot"/>
+      </p:par>
+    </p:tnLst>
+  </p:timing>
 </p:sld>
 </file>
 
@@ -4114,6 +4165,107 @@
           <a:lstStyle/>
           <a:p>
             <a:r>
+              <a:rPr lang="en-US" dirty="0" smtClean="0"/>
+              <a:t>Sailing Over the Edge</a:t>
+            </a:r>
+            <a:endParaRPr lang="en-US" dirty="0"/>
+          </a:p>
+        </p:txBody>
+      </p:sp>
+      <p:sp>
+        <p:nvSpPr>
+          <p:cNvPr id="3" name="Content Placeholder 2"/>
+          <p:cNvSpPr>
+            <a:spLocks noGrp="1"/>
+          </p:cNvSpPr>
+          <p:nvPr>
+            <p:ph idx="1"/>
+          </p:nvPr>
+        </p:nvSpPr>
+        <p:spPr/>
+        <p:txBody>
+          <a:bodyPr/>
+          <a:lstStyle/>
+          <a:p>
+            <a:r>
+              <a:rPr lang="en-US" dirty="0" err="1" smtClean="0"/>
+              <a:t>Cython</a:t>
+            </a:r>
+            <a:endParaRPr lang="en-US" dirty="0" smtClean="0"/>
+          </a:p>
+          <a:p>
+            <a:r>
+              <a:rPr lang="en-US" dirty="0" smtClean="0"/>
+              <a:t>Multiprocessing</a:t>
+            </a:r>
+          </a:p>
+          <a:p>
+            <a:pPr lvl="1"/>
+            <a:r>
+              <a:rPr lang="en-US" dirty="0" smtClean="0"/>
+              <a:t>The GIL</a:t>
+            </a:r>
+          </a:p>
+          <a:p>
+            <a:pPr lvl="1"/>
+            <a:r>
+              <a:rPr lang="en-US" dirty="0" err="1" smtClean="0"/>
+              <a:t>Jython</a:t>
+            </a:r>
+            <a:r>
+              <a:rPr lang="en-US" dirty="0" smtClean="0"/>
+              <a:t> – no GIL – true multithreading</a:t>
+            </a:r>
+            <a:endParaRPr lang="en-US" dirty="0"/>
+          </a:p>
+        </p:txBody>
+      </p:sp>
+    </p:spTree>
+    <p:extLst>
+      <p:ext uri="{BB962C8B-B14F-4D97-AF65-F5344CB8AC3E}">
+        <p14:creationId xmlns:p14="http://schemas.microsoft.com/office/powerpoint/2010/main" val="3906047054"/>
+      </p:ext>
+    </p:extLst>
+  </p:cSld>
+  <p:clrMapOvr>
+    <a:masterClrMapping/>
+  </p:clrMapOvr>
+</p:sld>
+</file>
+
+<file path=ppt/slides/slide14.xml><?xml version="1.0" encoding="utf-8"?>
+<p:sld xmlns:a="http://schemas.openxmlformats.org/drawingml/2006/main" xmlns:r="http://schemas.openxmlformats.org/officeDocument/2006/relationships" xmlns:p="http://schemas.openxmlformats.org/presentationml/2006/main">
+  <p:cSld>
+    <p:spTree>
+      <p:nvGrpSpPr>
+        <p:cNvPr id="1" name=""/>
+        <p:cNvGrpSpPr/>
+        <p:nvPr/>
+      </p:nvGrpSpPr>
+      <p:grpSpPr>
+        <a:xfrm>
+          <a:off x="0" y="0"/>
+          <a:ext cx="0" cy="0"/>
+          <a:chOff x="0" y="0"/>
+          <a:chExt cx="0" cy="0"/>
+        </a:xfrm>
+      </p:grpSpPr>
+      <p:sp>
+        <p:nvSpPr>
+          <p:cNvPr id="2" name="Title 1"/>
+          <p:cNvSpPr>
+            <a:spLocks noGrp="1"/>
+          </p:cNvSpPr>
+          <p:nvPr>
+            <p:ph type="title"/>
+          </p:nvPr>
+        </p:nvSpPr>
+        <p:spPr/>
+        <p:txBody>
+          <a:bodyPr/>
+          <a:lstStyle/>
+          <a:p>
+            <a:r>
               <a:rPr lang="en-US" dirty="0" smtClean="0">
                 <a:latin typeface="Apple Chancery"/>
               </a:rPr>
@@ -4205,7 +4357,7 @@
 </p:sld>
 </file>
 
-<file path=ppt/slides/slide14.xml><?xml version="1.0" encoding="utf-8"?>
+<file path=ppt/slides/slide15.xml><?xml version="1.0" encoding="utf-8"?>
 <p:sld xmlns:a="http://schemas.openxmlformats.org/drawingml/2006/main" xmlns:r="http://schemas.openxmlformats.org/officeDocument/2006/relationships" xmlns:p="http://schemas.openxmlformats.org/presentationml/2006/main">
   <p:cSld>
     <p:spTree>
@@ -4799,36 +4951,14 @@
           <a:p>
             <a:r>
               <a:rPr lang="en-US" dirty="0" smtClean="0"/>
-              <a:t>Just needed a way to know if different approaches to solving problem </a:t>
-            </a:r>
-            <a:r>
-              <a:rPr lang="en-US" dirty="0" smtClean="0"/>
-              <a:t>performed any better</a:t>
-            </a:r>
-            <a:endParaRPr lang="en-US" dirty="0" smtClean="0"/>
-          </a:p>
-          <a:p>
-            <a:r>
-              <a:rPr lang="en-US" dirty="0" smtClean="0"/>
-              <a:t>Mostly </a:t>
-            </a:r>
-            <a:r>
-              <a:rPr lang="en-US" dirty="0" smtClean="0"/>
-              <a:t>CPU bound in tight loops – want to </a:t>
-            </a:r>
-            <a:r>
-              <a:rPr lang="en-US" dirty="0" smtClean="0"/>
-              <a:t>test </a:t>
-            </a:r>
-            <a:r>
-              <a:rPr lang="en-US" dirty="0" smtClean="0"/>
-              <a:t>true execution </a:t>
-            </a:r>
-            <a:r>
-              <a:rPr lang="en-US" dirty="0" smtClean="0"/>
-              <a:t>performance and ignore overhead</a:t>
-            </a:r>
-            <a:endParaRPr lang="en-US" dirty="0" smtClean="0"/>
+              <a:t>Just needed a way to know if different approaches to solving problem performed any better</a:t>
+            </a:r>
+          </a:p>
+          <a:p>
+            <a:r>
+              <a:rPr lang="en-US" dirty="0" smtClean="0"/>
+              <a:t>Mostly CPU bound in tight loops – want to test true execution performance and ignore overhead</a:t>
+            </a:r>
           </a:p>
           <a:p>
             <a:r>
@@ -4930,11 +5060,7 @@
           <a:p>
             <a:r>
               <a:rPr lang="en-US" dirty="0" smtClean="0"/>
-              <a:t>prob001 – trivial in </a:t>
-            </a:r>
-            <a:r>
-              <a:rPr lang="en-US" dirty="0" smtClean="0"/>
-              <a:t>Python</a:t>
+              <a:t>prob001 – trivial in Python</a:t>
             </a:r>
           </a:p>
           <a:p>
@@ -4945,11 +5071,7 @@
             </a:r>
             <a:r>
               <a:rPr lang="en-US" dirty="0" smtClean="0"/>
-              <a:t> : 127 </a:t>
-            </a:r>
-            <a:r>
-              <a:rPr lang="en-US" dirty="0" smtClean="0"/>
-              <a:t>µsec, </a:t>
+              <a:t> : 127 µsec, </a:t>
             </a:r>
             <a:r>
               <a:rPr lang="en-US" dirty="0" err="1" smtClean="0"/>
@@ -4957,11 +5079,7 @@
             </a:r>
             <a:r>
               <a:rPr lang="en-US" dirty="0" smtClean="0"/>
-              <a:t> : 76 µsec</a:t>
-            </a:r>
-            <a:r>
-              <a:rPr lang="en-US" dirty="0" smtClean="0"/>
-              <a:t>, </a:t>
+              <a:t> : 76 µsec, </a:t>
             </a:r>
             <a:r>
               <a:rPr lang="en-US" dirty="0" err="1" smtClean="0"/>
@@ -4971,7 +5089,6 @@
               <a:rPr lang="en-US" dirty="0" smtClean="0"/>
               <a:t> : 33 µsec</a:t>
             </a:r>
-            <a:endParaRPr lang="en-US" dirty="0" smtClean="0"/>
           </a:p>
           <a:p>
             <a:r>
@@ -5190,34 +5307,44 @@
           <a:p>
             <a:r>
               <a:rPr lang="en-US" dirty="0" smtClean="0"/>
-              <a:t>Python Modules</a:t>
-            </a:r>
-            <a:endParaRPr lang="en-US" dirty="0"/>
-          </a:p>
-        </p:txBody>
-      </p:sp>
-      <p:sp>
-        <p:nvSpPr>
-          <p:cNvPr id="3" name="Content Placeholder 2"/>
-          <p:cNvSpPr>
-            <a:spLocks noGrp="1"/>
-          </p:cNvSpPr>
-          <p:nvPr>
-            <p:ph idx="1"/>
-          </p:nvPr>
-        </p:nvSpPr>
-        <p:spPr/>
-        <p:txBody>
-          <a:bodyPr/>
-          <a:lstStyle/>
-          <a:p>
+              <a:t>Python </a:t>
+            </a:r>
+            <a:r>
+              <a:rPr lang="en-US" dirty="0" smtClean="0"/>
+              <a:t>Modules - </a:t>
+            </a:r>
             <a:r>
               <a:rPr lang="en-US" dirty="0" err="1" smtClean="0"/>
               <a:t>SymPy</a:t>
             </a:r>
-            <a:r>
-              <a:rPr lang="en-US" dirty="0" smtClean="0"/>
-              <a:t> – prime number support</a:t>
+            <a:endParaRPr lang="en-US" dirty="0"/>
+          </a:p>
+        </p:txBody>
+      </p:sp>
+      <p:sp>
+        <p:nvSpPr>
+          <p:cNvPr id="3" name="Content Placeholder 2"/>
+          <p:cNvSpPr>
+            <a:spLocks noGrp="1"/>
+          </p:cNvSpPr>
+          <p:nvPr>
+            <p:ph idx="1"/>
+          </p:nvPr>
+        </p:nvSpPr>
+        <p:spPr/>
+        <p:txBody>
+          <a:bodyPr>
+            <a:normAutofit/>
+          </a:bodyPr>
+          <a:lstStyle/>
+          <a:p>
+            <a:r>
+              <a:rPr lang="en-US" dirty="0" smtClean="0"/>
+              <a:t>prime </a:t>
+            </a:r>
+            <a:r>
+              <a:rPr lang="en-US" dirty="0" smtClean="0"/>
+              <a:t>number support</a:t>
             </a:r>
           </a:p>
           <a:p>
@@ -5233,6 +5360,53 @@
             <a:endParaRPr lang="en-US" dirty="0" smtClean="0"/>
           </a:p>
           <a:p>
+            <a:pPr lvl="2"/>
+            <a:r>
+              <a:rPr lang="en-US" dirty="0" err="1" smtClean="0"/>
+              <a:t>CPython</a:t>
+            </a:r>
+            <a:r>
+              <a:rPr lang="en-US" dirty="0" smtClean="0"/>
+              <a:t> : 5ms, </a:t>
+            </a:r>
+            <a:r>
+              <a:rPr lang="en-US" dirty="0" err="1" smtClean="0"/>
+              <a:t>Jython</a:t>
+            </a:r>
+            <a:r>
+              <a:rPr lang="en-US" dirty="0" smtClean="0"/>
+              <a:t> : 3ms, </a:t>
+            </a:r>
+            <a:r>
+              <a:rPr lang="en-US" dirty="0" err="1" smtClean="0"/>
+              <a:t>PyPy</a:t>
+            </a:r>
+            <a:r>
+              <a:rPr lang="en-US" dirty="0" smtClean="0"/>
+              <a:t> : 1.4ms</a:t>
+            </a:r>
+          </a:p>
+          <a:p>
+            <a:pPr lvl="2"/>
+            <a:r>
+              <a:rPr lang="en-US" dirty="0" smtClean="0"/>
+              <a:t>.2ms with module – but no support in </a:t>
+            </a:r>
+            <a:r>
+              <a:rPr lang="en-US" dirty="0" err="1" smtClean="0"/>
+              <a:t>Jython</a:t>
+            </a:r>
+            <a:r>
+              <a:rPr lang="en-US" dirty="0" smtClean="0"/>
+              <a:t> or </a:t>
+            </a:r>
+            <a:r>
+              <a:rPr lang="en-US" dirty="0" err="1" smtClean="0"/>
+              <a:t>PyPy</a:t>
+            </a:r>
+            <a:endParaRPr lang="en-US" dirty="0" smtClean="0"/>
+          </a:p>
+          <a:p>
             <a:pPr lvl="1"/>
             <a:r>
               <a:rPr lang="en-US" dirty="0"/>
@@ -5240,41 +5414,74 @@
             </a:r>
             <a:r>
               <a:rPr lang="en-US" dirty="0" smtClean="0"/>
-              <a:t>rob007 – prime</a:t>
-            </a:r>
-          </a:p>
-          <a:p>
-            <a:r>
-              <a:rPr lang="en-US" dirty="0" err="1"/>
-              <a:t>d</a:t>
-            </a:r>
+              <a:t>rob007 – </a:t>
+            </a:r>
+            <a:r>
+              <a:rPr lang="en-US" dirty="0" smtClean="0"/>
+              <a:t>prime</a:t>
+            </a:r>
+          </a:p>
+          <a:p>
+            <a:pPr lvl="2"/>
             <a:r>
               <a:rPr lang="en-US" dirty="0" err="1" smtClean="0"/>
-              <a:t>atetime</a:t>
-            </a:r>
-            <a:r>
-              <a:rPr lang="en-US" dirty="0" smtClean="0"/>
-              <a:t> – date/time arithmetic</a:t>
-            </a:r>
-          </a:p>
-          <a:p>
-            <a:pPr lvl="1"/>
-            <a:r>
-              <a:rPr lang="en-US" dirty="0"/>
-              <a:t>p</a:t>
-            </a:r>
-            <a:r>
-              <a:rPr lang="en-US" dirty="0" smtClean="0"/>
-              <a:t>rob019 – built in calendar</a:t>
-            </a:r>
-          </a:p>
-          <a:p>
-            <a:r>
-              <a:rPr lang="en-US" dirty="0" smtClean="0"/>
-              <a:t>Modules can be much faster and easier to read – use them!</a:t>
-            </a:r>
-          </a:p>
-          <a:p>
+              <a:t>CPython</a:t>
+            </a:r>
+            <a:r>
+              <a:rPr lang="en-US" dirty="0" smtClean="0"/>
+              <a:t> : 6s, </a:t>
+            </a:r>
+            <a:r>
+              <a:rPr lang="en-US" dirty="0" err="1" smtClean="0"/>
+              <a:t>Jython</a:t>
+            </a:r>
+            <a:r>
+              <a:rPr lang="en-US" dirty="0" smtClean="0"/>
+              <a:t> : 4s, </a:t>
+            </a:r>
+            <a:r>
+              <a:rPr lang="en-US" dirty="0" err="1" smtClean="0"/>
+              <a:t>PyPy</a:t>
+            </a:r>
+            <a:r>
+              <a:rPr lang="en-US" dirty="0" smtClean="0"/>
+              <a:t> : 1.7s</a:t>
+            </a:r>
+          </a:p>
+          <a:p>
+            <a:pPr lvl="2"/>
+            <a:r>
+              <a:rPr lang="en-US" dirty="0" smtClean="0"/>
+              <a:t>51ms with module – no support in </a:t>
+            </a:r>
+            <a:r>
+              <a:rPr lang="en-US" dirty="0" err="1" smtClean="0"/>
+              <a:t>Jython</a:t>
+            </a:r>
+            <a:r>
+              <a:rPr lang="en-US" dirty="0" smtClean="0"/>
+              <a:t> or </a:t>
+            </a:r>
+            <a:r>
+              <a:rPr lang="en-US" dirty="0" err="1" smtClean="0"/>
+              <a:t>PyPy</a:t>
+            </a:r>
+            <a:endParaRPr lang="en-US" dirty="0" smtClean="0"/>
+          </a:p>
+          <a:p>
+            <a:pPr lvl="2"/>
+            <a:r>
+              <a:rPr lang="en-US" dirty="0" smtClean="0"/>
+              <a:t>.5ms with loop of 100x – </a:t>
+            </a:r>
+            <a:r>
+              <a:rPr lang="en-US" dirty="0" err="1" smtClean="0"/>
+              <a:t>memoizing</a:t>
+            </a:r>
+            <a:r>
+              <a:rPr lang="en-US" dirty="0" smtClean="0"/>
+              <a:t>?</a:t>
+            </a:r>
             <a:endParaRPr lang="en-US" dirty="0"/>
           </a:p>
         </p:txBody>
@@ -5333,7 +5540,15 @@
           <a:p>
             <a:r>
               <a:rPr lang="en-US" dirty="0" smtClean="0"/>
-              <a:t>Algorithms</a:t>
+              <a:t>Python </a:t>
+            </a:r>
+            <a:r>
+              <a:rPr lang="en-US" dirty="0" smtClean="0"/>
+              <a:t>Modules - </a:t>
+            </a:r>
+            <a:r>
+              <a:rPr lang="en-US" dirty="0" err="1" smtClean="0"/>
+              <a:t>datetime</a:t>
             </a:r>
             <a:endParaRPr lang="en-US" dirty="0"/>
           </a:p>
@@ -5351,16 +5566,96 @@
         </p:nvSpPr>
         <p:spPr/>
         <p:txBody>
-          <a:bodyPr/>
-          <a:lstStyle/>
-          <a:p>
-            <a:r>
-              <a:rPr lang="en-US" dirty="0"/>
-              <a:t>B</a:t>
-            </a:r>
-            <a:r>
-              <a:rPr lang="en-US" dirty="0" smtClean="0"/>
-              <a:t>etter algorithms yield biggest payoff</a:t>
+          <a:bodyPr>
+            <a:normAutofit/>
+          </a:bodyPr>
+          <a:lstStyle/>
+          <a:p>
+            <a:r>
+              <a:rPr lang="en-US" dirty="0" smtClean="0"/>
+              <a:t>date/time arithmetic</a:t>
+            </a:r>
+          </a:p>
+          <a:p>
+            <a:pPr lvl="1"/>
+            <a:r>
+              <a:rPr lang="en-US" dirty="0" smtClean="0"/>
+              <a:t>prob019 – built in calendar</a:t>
+            </a:r>
+          </a:p>
+          <a:p>
+            <a:pPr lvl="2"/>
+            <a:r>
+              <a:rPr lang="en-US" dirty="0" err="1" smtClean="0"/>
+              <a:t>CPython</a:t>
+            </a:r>
+            <a:r>
+              <a:rPr lang="en-US" dirty="0" smtClean="0"/>
+              <a:t> : .9ms, </a:t>
+            </a:r>
+            <a:r>
+              <a:rPr lang="en-US" dirty="0" err="1" smtClean="0"/>
+              <a:t>Jython</a:t>
+            </a:r>
+            <a:r>
+              <a:rPr lang="en-US" dirty="0" smtClean="0"/>
+              <a:t> : 1.2ms, </a:t>
+            </a:r>
+            <a:r>
+              <a:rPr lang="en-US" dirty="0" err="1" smtClean="0"/>
+              <a:t>PyPy</a:t>
+            </a:r>
+            <a:r>
+              <a:rPr lang="en-US" dirty="0" smtClean="0"/>
+              <a:t> : .13ms</a:t>
+            </a:r>
+          </a:p>
+          <a:p>
+            <a:pPr lvl="2"/>
+            <a:r>
+              <a:rPr lang="en-US" dirty="0" err="1" smtClean="0"/>
+              <a:t>CPython</a:t>
+            </a:r>
+            <a:r>
+              <a:rPr lang="en-US" dirty="0" smtClean="0"/>
+              <a:t> : .5ms, </a:t>
+            </a:r>
+            <a:r>
+              <a:rPr lang="en-US" dirty="0" err="1" smtClean="0"/>
+              <a:t>Jython</a:t>
+            </a:r>
+            <a:r>
+              <a:rPr lang="en-US" dirty="0" smtClean="0"/>
+              <a:t> : 4ms, </a:t>
+            </a:r>
+            <a:r>
+              <a:rPr lang="en-US" dirty="0" err="1" smtClean="0"/>
+              <a:t>PyPy</a:t>
+            </a:r>
+            <a:r>
+              <a:rPr lang="en-US" dirty="0" smtClean="0"/>
+              <a:t> : .12ms</a:t>
+            </a:r>
+            <a:endParaRPr lang="en-US" dirty="0" smtClean="0"/>
+          </a:p>
+          <a:p>
+            <a:r>
+              <a:rPr lang="en-US" dirty="0" smtClean="0"/>
+              <a:t>Modules can be much faster and easier to read – use them!</a:t>
+            </a:r>
+          </a:p>
+          <a:p>
+            <a:r>
+              <a:rPr lang="en-US" dirty="0" smtClean="0"/>
+              <a:t>Watch out – not all modules are supported by non-</a:t>
+            </a:r>
+            <a:r>
+              <a:rPr lang="en-US" dirty="0" err="1" smtClean="0"/>
+              <a:t>CPython</a:t>
+            </a:r>
+            <a:r>
+              <a:rPr lang="en-US" dirty="0" smtClean="0"/>
+              <a:t> engines</a:t>
             </a:r>
             <a:endParaRPr lang="en-US" dirty="0"/>
           </a:p>
@@ -5369,7 +5664,7 @@
     </p:spTree>
     <p:extLst>
       <p:ext uri="{BB962C8B-B14F-4D97-AF65-F5344CB8AC3E}">
-        <p14:creationId xmlns:p14="http://schemas.microsoft.com/office/powerpoint/2010/main" val="2151259301"/>
+        <p14:creationId xmlns:p14="http://schemas.microsoft.com/office/powerpoint/2010/main" val="2165426660"/>
       </p:ext>
     </p:extLst>
   </p:cSld>

</xml_diff>

<commit_message>
complete algorithms slide and support code
</commit_message>
<xml_diff>
--- a/Python Performance Talk.pptx
+++ b/Python Performance Talk.pptx
@@ -404,7 +404,7 @@
           <a:p>
             <a:fld id="{B01F9CA3-105E-4857-9057-6DB6197DA786}" type="datetimeFigureOut">
               <a:rPr lang="en-US" smtClean="0"/>
-              <a:t>4/25/17</a:t>
+              <a:t>4/27/17</a:t>
             </a:fld>
             <a:endParaRPr lang="en-US"/>
           </a:p>
@@ -596,7 +596,7 @@
           <a:p>
             <a:fld id="{B01F9CA3-105E-4857-9057-6DB6197DA786}" type="datetimeFigureOut">
               <a:rPr lang="en-US" smtClean="0"/>
-              <a:t>4/25/17</a:t>
+              <a:t>4/27/17</a:t>
             </a:fld>
             <a:endParaRPr lang="en-US"/>
           </a:p>
@@ -865,7 +865,7 @@
           <a:p>
             <a:fld id="{B01F9CA3-105E-4857-9057-6DB6197DA786}" type="datetimeFigureOut">
               <a:rPr lang="en-US" smtClean="0"/>
-              <a:t>4/25/17</a:t>
+              <a:t>4/27/17</a:t>
             </a:fld>
             <a:endParaRPr lang="en-US"/>
           </a:p>
@@ -1044,7 +1044,7 @@
           <a:p>
             <a:fld id="{B01F9CA3-105E-4857-9057-6DB6197DA786}" type="datetimeFigureOut">
               <a:rPr lang="en-US" smtClean="0"/>
-              <a:t>4/25/17</a:t>
+              <a:t>4/27/17</a:t>
             </a:fld>
             <a:endParaRPr lang="en-US"/>
           </a:p>
@@ -1213,7 +1213,7 @@
           <a:p>
             <a:fld id="{B01F9CA3-105E-4857-9057-6DB6197DA786}" type="datetimeFigureOut">
               <a:rPr lang="en-US" smtClean="0"/>
-              <a:t>4/25/17</a:t>
+              <a:t>4/27/17</a:t>
             </a:fld>
             <a:endParaRPr lang="en-US"/>
           </a:p>
@@ -1455,7 +1455,7 @@
           <a:p>
             <a:fld id="{B01F9CA3-105E-4857-9057-6DB6197DA786}" type="datetimeFigureOut">
               <a:rPr lang="en-US" smtClean="0"/>
-              <a:t>4/25/17</a:t>
+              <a:t>4/27/17</a:t>
             </a:fld>
             <a:endParaRPr lang="en-US"/>
           </a:p>
@@ -1778,7 +1778,7 @@
           <a:p>
             <a:fld id="{B01F9CA3-105E-4857-9057-6DB6197DA786}" type="datetimeFigureOut">
               <a:rPr lang="en-US" smtClean="0"/>
-              <a:t>4/25/17</a:t>
+              <a:t>4/27/17</a:t>
             </a:fld>
             <a:endParaRPr lang="en-US"/>
           </a:p>
@@ -2076,7 +2076,7 @@
           <a:p>
             <a:fld id="{B01F9CA3-105E-4857-9057-6DB6197DA786}" type="datetimeFigureOut">
               <a:rPr lang="en-US" smtClean="0"/>
-              <a:t>4/25/17</a:t>
+              <a:t>4/27/17</a:t>
             </a:fld>
             <a:endParaRPr lang="en-US"/>
           </a:p>
@@ -2532,7 +2532,7 @@
           <a:p>
             <a:fld id="{B01F9CA3-105E-4857-9057-6DB6197DA786}" type="datetimeFigureOut">
               <a:rPr lang="en-US" smtClean="0"/>
-              <a:t>4/25/17</a:t>
+              <a:t>4/27/17</a:t>
             </a:fld>
             <a:endParaRPr lang="en-US"/>
           </a:p>
@@ -2645,7 +2645,7 @@
           <a:p>
             <a:fld id="{B01F9CA3-105E-4857-9057-6DB6197DA786}" type="datetimeFigureOut">
               <a:rPr lang="en-US" smtClean="0"/>
-              <a:t>4/25/17</a:t>
+              <a:t>4/27/17</a:t>
             </a:fld>
             <a:endParaRPr lang="en-US"/>
           </a:p>
@@ -2735,7 +2735,7 @@
           <a:p>
             <a:fld id="{B01F9CA3-105E-4857-9057-6DB6197DA786}" type="datetimeFigureOut">
               <a:rPr lang="en-US" smtClean="0"/>
-              <a:t>4/25/17</a:t>
+              <a:t>4/27/17</a:t>
             </a:fld>
             <a:endParaRPr lang="en-US"/>
           </a:p>
@@ -3017,7 +3017,7 @@
           <a:p>
             <a:fld id="{B01F9CA3-105E-4857-9057-6DB6197DA786}" type="datetimeFigureOut">
               <a:rPr lang="en-US" smtClean="0"/>
-              <a:t>4/25/17</a:t>
+              <a:t>4/27/17</a:t>
             </a:fld>
             <a:endParaRPr lang="en-US"/>
           </a:p>
@@ -3223,7 +3223,7 @@
           <a:p>
             <a:fld id="{B01F9CA3-105E-4857-9057-6DB6197DA786}" type="datetimeFigureOut">
               <a:rPr lang="en-US" smtClean="0"/>
-              <a:t>4/25/17</a:t>
+              <a:t>4/27/17</a:t>
             </a:fld>
             <a:endParaRPr lang="en-US"/>
           </a:p>
@@ -3840,20 +3840,7 @@
               <a:rPr lang="en-US" dirty="0" smtClean="0"/>
               <a:t>payoff</a:t>
             </a:r>
-          </a:p>
-          <a:p>
-            <a:r>
-              <a:rPr lang="en-US" dirty="0" smtClean="0"/>
-              <a:t>prob012 – use O(c) </a:t>
-            </a:r>
-            <a:r>
-              <a:rPr lang="en-US" dirty="0" err="1" smtClean="0"/>
-              <a:t>vs</a:t>
-            </a:r>
-            <a:r>
-              <a:rPr lang="en-US" dirty="0" smtClean="0"/>
-              <a:t> O(n)</a:t>
-            </a:r>
+            <a:endParaRPr lang="en-US" dirty="0" smtClean="0"/>
           </a:p>
           <a:p>
             <a:r>
@@ -3871,6 +3858,41 @@
             <a:endParaRPr lang="en-US" dirty="0" smtClean="0"/>
           </a:p>
           <a:p>
+            <a:pPr lvl="1"/>
+            <a:r>
+              <a:rPr lang="en-US" dirty="0" smtClean="0"/>
+              <a:t>w/o a cache, took too long to run</a:t>
+            </a:r>
+          </a:p>
+          <a:p>
+            <a:pPr lvl="1"/>
+            <a:r>
+              <a:rPr lang="en-US" dirty="0" err="1" smtClean="0"/>
+              <a:t>CPython</a:t>
+            </a:r>
+            <a:r>
+              <a:rPr lang="en-US" dirty="0" smtClean="0"/>
+              <a:t> : .32ms, </a:t>
+            </a:r>
+            <a:r>
+              <a:rPr lang="en-US" dirty="0" err="1" smtClean="0"/>
+              <a:t>Jython</a:t>
+            </a:r>
+            <a:r>
+              <a:rPr lang="en-US" dirty="0" smtClean="0"/>
+              <a:t> : .27ms, </a:t>
+            </a:r>
+            <a:r>
+              <a:rPr lang="en-US" dirty="0" err="1" smtClean="0"/>
+              <a:t>PyPy</a:t>
+            </a:r>
+            <a:r>
+              <a:rPr lang="en-US" dirty="0" smtClean="0"/>
+              <a:t> : .1ms</a:t>
+            </a:r>
+            <a:endParaRPr lang="en-US" dirty="0" smtClean="0"/>
+          </a:p>
+          <a:p>
             <a:r>
               <a:rPr lang="en-US" dirty="0"/>
               <a:t>p</a:t>
@@ -3885,7 +3907,66 @@
             </a:r>
             <a:r>
               <a:rPr lang="en-US" dirty="0" smtClean="0"/>
-              <a:t> O(2^n)</a:t>
+              <a:t> O(2^n</a:t>
+            </a:r>
+            <a:r>
+              <a:rPr lang="en-US" dirty="0" smtClean="0"/>
+              <a:t>)</a:t>
+            </a:r>
+          </a:p>
+          <a:p>
+            <a:pPr lvl="1"/>
+            <a:r>
+              <a:rPr lang="en-US" dirty="0" smtClean="0"/>
+              <a:t>Brute force </a:t>
+            </a:r>
+            <a:r>
+              <a:rPr lang="en-US" smtClean="0"/>
+              <a:t>checking trillion </a:t>
+            </a:r>
+            <a:r>
+              <a:rPr lang="en-US" dirty="0" smtClean="0"/>
+              <a:t>routes/sec would still take &gt;</a:t>
+            </a:r>
+            <a:r>
+              <a:rPr lang="en-US" smtClean="0"/>
+              <a:t>20 billion </a:t>
+            </a:r>
+            <a:r>
+              <a:rPr lang="en-US" dirty="0" smtClean="0"/>
+              <a:t>years – 2^</a:t>
+            </a:r>
+            <a:r>
+              <a:rPr lang="en-US" smtClean="0"/>
+              <a:t>99 routes.</a:t>
+            </a:r>
+            <a:endParaRPr lang="en-US" dirty="0" smtClean="0"/>
+          </a:p>
+          <a:p>
+            <a:pPr lvl="1"/>
+            <a:r>
+              <a:rPr lang="en-US" dirty="0" err="1" smtClean="0"/>
+              <a:t>CPython</a:t>
+            </a:r>
+            <a:r>
+              <a:rPr lang="en-US" dirty="0" smtClean="0"/>
+              <a:t> : 5ms, </a:t>
+            </a:r>
+            <a:r>
+              <a:rPr lang="en-US" dirty="0" err="1" smtClean="0"/>
+              <a:t>Jython</a:t>
+            </a:r>
+            <a:r>
+              <a:rPr lang="en-US" dirty="0" smtClean="0"/>
+              <a:t> : 6ms, </a:t>
+            </a:r>
+            <a:r>
+              <a:rPr lang="en-US" dirty="0" err="1" smtClean="0"/>
+              <a:t>PyPy</a:t>
+            </a:r>
+            <a:r>
+              <a:rPr lang="en-US" dirty="0" smtClean="0"/>
+              <a:t> : .8ms</a:t>
             </a:r>
             <a:endParaRPr lang="en-US" dirty="0"/>
           </a:p>
@@ -4075,13 +4156,8 @@
           <a:p>
             <a:r>
               <a:rPr lang="en-US" dirty="0" smtClean="0"/>
-              <a:t>Modules aren’t always </a:t>
-            </a:r>
-            <a:r>
-              <a:rPr lang="en-US" dirty="0" smtClean="0"/>
-              <a:t>faster : prob009, prob028</a:t>
-            </a:r>
-            <a:endParaRPr lang="en-US" dirty="0" smtClean="0"/>
+              <a:t>Modules aren’t always faster : prob009, prob028</a:t>
+            </a:r>
           </a:p>
           <a:p>
             <a:r>
@@ -4098,11 +4174,7 @@
             </a:r>
             <a:r>
               <a:rPr lang="en-US" dirty="0" smtClean="0"/>
-              <a:t> aren’t always </a:t>
-            </a:r>
-            <a:r>
-              <a:rPr lang="en-US" dirty="0" smtClean="0"/>
-              <a:t>faster </a:t>
+              <a:t> aren’t always faster </a:t>
             </a:r>
             <a:r>
               <a:rPr lang="en-US" smtClean="0"/>
@@ -5307,11 +5379,7 @@
           <a:p>
             <a:r>
               <a:rPr lang="en-US" dirty="0" smtClean="0"/>
-              <a:t>Python </a:t>
-            </a:r>
-            <a:r>
-              <a:rPr lang="en-US" dirty="0" smtClean="0"/>
-              <a:t>Modules - </a:t>
+              <a:t>Python Modules - </a:t>
             </a:r>
             <a:r>
               <a:rPr lang="en-US" dirty="0" err="1" smtClean="0"/>
@@ -5340,11 +5408,7 @@
           <a:p>
             <a:r>
               <a:rPr lang="en-US" dirty="0" smtClean="0"/>
-              <a:t>prime </a:t>
-            </a:r>
-            <a:r>
-              <a:rPr lang="en-US" dirty="0" smtClean="0"/>
-              <a:t>number support</a:t>
+              <a:t>prime number support</a:t>
             </a:r>
           </a:p>
           <a:p>
@@ -5414,11 +5478,7 @@
             </a:r>
             <a:r>
               <a:rPr lang="en-US" dirty="0" smtClean="0"/>
-              <a:t>rob007 – </a:t>
-            </a:r>
-            <a:r>
-              <a:rPr lang="en-US" dirty="0" smtClean="0"/>
-              <a:t>prime</a:t>
+              <a:t>rob007 – prime</a:t>
             </a:r>
           </a:p>
           <a:p>
@@ -5540,11 +5600,7 @@
           <a:p>
             <a:r>
               <a:rPr lang="en-US" dirty="0" smtClean="0"/>
-              <a:t>Python </a:t>
-            </a:r>
-            <a:r>
-              <a:rPr lang="en-US" dirty="0" smtClean="0"/>
-              <a:t>Modules - </a:t>
+              <a:t>Python Modules - </a:t>
             </a:r>
             <a:r>
               <a:rPr lang="en-US" dirty="0" err="1" smtClean="0"/>
@@ -5636,7 +5692,6 @@
               <a:rPr lang="en-US" dirty="0" smtClean="0"/>
               <a:t> : .12ms</a:t>
             </a:r>
-            <a:endParaRPr lang="en-US" dirty="0" smtClean="0"/>
           </a:p>
           <a:p>
             <a:r>

</xml_diff>

<commit_message>
update talk, add more code examples
</commit_message>
<xml_diff>
--- a/Python Performance Talk.pptx
+++ b/Python Performance Talk.pptx
@@ -17,9 +17,10 @@
     <p:sldId id="264" r:id="rId11"/>
     <p:sldId id="266" r:id="rId12"/>
     <p:sldId id="265" r:id="rId13"/>
-    <p:sldId id="269" r:id="rId14"/>
-    <p:sldId id="268" r:id="rId15"/>
-    <p:sldId id="267" r:id="rId16"/>
+    <p:sldId id="271" r:id="rId14"/>
+    <p:sldId id="269" r:id="rId15"/>
+    <p:sldId id="268" r:id="rId16"/>
+    <p:sldId id="267" r:id="rId17"/>
   </p:sldIdLst>
   <p:sldSz cx="9144000" cy="6858000" type="screen4x3"/>
   <p:notesSz cx="6858000" cy="9144000"/>
@@ -404,7 +405,7 @@
           <a:p>
             <a:fld id="{B01F9CA3-105E-4857-9057-6DB6197DA786}" type="datetimeFigureOut">
               <a:rPr lang="en-US" smtClean="0"/>
-              <a:t>4/27/17</a:t>
+              <a:t>5/31/17</a:t>
             </a:fld>
             <a:endParaRPr lang="en-US"/>
           </a:p>
@@ -596,7 +597,7 @@
           <a:p>
             <a:fld id="{B01F9CA3-105E-4857-9057-6DB6197DA786}" type="datetimeFigureOut">
               <a:rPr lang="en-US" smtClean="0"/>
-              <a:t>4/27/17</a:t>
+              <a:t>5/31/17</a:t>
             </a:fld>
             <a:endParaRPr lang="en-US"/>
           </a:p>
@@ -865,7 +866,7 @@
           <a:p>
             <a:fld id="{B01F9CA3-105E-4857-9057-6DB6197DA786}" type="datetimeFigureOut">
               <a:rPr lang="en-US" smtClean="0"/>
-              <a:t>4/27/17</a:t>
+              <a:t>5/31/17</a:t>
             </a:fld>
             <a:endParaRPr lang="en-US"/>
           </a:p>
@@ -1044,7 +1045,7 @@
           <a:p>
             <a:fld id="{B01F9CA3-105E-4857-9057-6DB6197DA786}" type="datetimeFigureOut">
               <a:rPr lang="en-US" smtClean="0"/>
-              <a:t>4/27/17</a:t>
+              <a:t>5/31/17</a:t>
             </a:fld>
             <a:endParaRPr lang="en-US"/>
           </a:p>
@@ -1213,7 +1214,7 @@
           <a:p>
             <a:fld id="{B01F9CA3-105E-4857-9057-6DB6197DA786}" type="datetimeFigureOut">
               <a:rPr lang="en-US" smtClean="0"/>
-              <a:t>4/27/17</a:t>
+              <a:t>5/31/17</a:t>
             </a:fld>
             <a:endParaRPr lang="en-US"/>
           </a:p>
@@ -1455,7 +1456,7 @@
           <a:p>
             <a:fld id="{B01F9CA3-105E-4857-9057-6DB6197DA786}" type="datetimeFigureOut">
               <a:rPr lang="en-US" smtClean="0"/>
-              <a:t>4/27/17</a:t>
+              <a:t>5/31/17</a:t>
             </a:fld>
             <a:endParaRPr lang="en-US"/>
           </a:p>
@@ -1778,7 +1779,7 @@
           <a:p>
             <a:fld id="{B01F9CA3-105E-4857-9057-6DB6197DA786}" type="datetimeFigureOut">
               <a:rPr lang="en-US" smtClean="0"/>
-              <a:t>4/27/17</a:t>
+              <a:t>5/31/17</a:t>
             </a:fld>
             <a:endParaRPr lang="en-US"/>
           </a:p>
@@ -2076,7 +2077,7 @@
           <a:p>
             <a:fld id="{B01F9CA3-105E-4857-9057-6DB6197DA786}" type="datetimeFigureOut">
               <a:rPr lang="en-US" smtClean="0"/>
-              <a:t>4/27/17</a:t>
+              <a:t>5/31/17</a:t>
             </a:fld>
             <a:endParaRPr lang="en-US"/>
           </a:p>
@@ -2532,7 +2533,7 @@
           <a:p>
             <a:fld id="{B01F9CA3-105E-4857-9057-6DB6197DA786}" type="datetimeFigureOut">
               <a:rPr lang="en-US" smtClean="0"/>
-              <a:t>4/27/17</a:t>
+              <a:t>5/31/17</a:t>
             </a:fld>
             <a:endParaRPr lang="en-US"/>
           </a:p>
@@ -2645,7 +2646,7 @@
           <a:p>
             <a:fld id="{B01F9CA3-105E-4857-9057-6DB6197DA786}" type="datetimeFigureOut">
               <a:rPr lang="en-US" smtClean="0"/>
-              <a:t>4/27/17</a:t>
+              <a:t>5/31/17</a:t>
             </a:fld>
             <a:endParaRPr lang="en-US"/>
           </a:p>
@@ -2735,7 +2736,7 @@
           <a:p>
             <a:fld id="{B01F9CA3-105E-4857-9057-6DB6197DA786}" type="datetimeFigureOut">
               <a:rPr lang="en-US" smtClean="0"/>
-              <a:t>4/27/17</a:t>
+              <a:t>5/31/17</a:t>
             </a:fld>
             <a:endParaRPr lang="en-US"/>
           </a:p>
@@ -3017,7 +3018,7 @@
           <a:p>
             <a:fld id="{B01F9CA3-105E-4857-9057-6DB6197DA786}" type="datetimeFigureOut">
               <a:rPr lang="en-US" smtClean="0"/>
-              <a:t>4/27/17</a:t>
+              <a:t>5/31/17</a:t>
             </a:fld>
             <a:endParaRPr lang="en-US"/>
           </a:p>
@@ -3223,7 +3224,7 @@
           <a:p>
             <a:fld id="{B01F9CA3-105E-4857-9057-6DB6197DA786}" type="datetimeFigureOut">
               <a:rPr lang="en-US" smtClean="0"/>
-              <a:t>4/27/17</a:t>
+              <a:t>5/31/17</a:t>
             </a:fld>
             <a:endParaRPr lang="en-US"/>
           </a:p>
@@ -3834,13 +3835,8 @@
             </a:r>
             <a:r>
               <a:rPr lang="en-US" dirty="0" smtClean="0"/>
-              <a:t>etter algorithms yield biggest </a:t>
-            </a:r>
-            <a:r>
-              <a:rPr lang="en-US" dirty="0" smtClean="0"/>
-              <a:t>payoff</a:t>
-            </a:r>
-            <a:endParaRPr lang="en-US" dirty="0" smtClean="0"/>
+              <a:t>etter algorithms yield biggest payoff</a:t>
+            </a:r>
           </a:p>
           <a:p>
             <a:r>
@@ -3890,7 +3886,6 @@
               <a:rPr lang="en-US" dirty="0" smtClean="0"/>
               <a:t> : .1ms</a:t>
             </a:r>
-            <a:endParaRPr lang="en-US" dirty="0" smtClean="0"/>
           </a:p>
           <a:p>
             <a:r>
@@ -3899,7 +3894,11 @@
             </a:r>
             <a:r>
               <a:rPr lang="en-US" dirty="0" smtClean="0"/>
-              <a:t>rob018, prob067 – O(n^2) </a:t>
+              <a:t>rob018, prob067 – O</a:t>
+            </a:r>
+            <a:r>
+              <a:rPr lang="en-US" dirty="0" smtClean="0"/>
+              <a:t>(n^2) </a:t>
             </a:r>
             <a:r>
               <a:rPr lang="en-US" dirty="0" err="1" smtClean="0"/>
@@ -3907,40 +3906,15 @@
             </a:r>
             <a:r>
               <a:rPr lang="en-US" dirty="0" smtClean="0"/>
-              <a:t> O(2^n</a:t>
-            </a:r>
-            <a:r>
-              <a:rPr lang="en-US" dirty="0" smtClean="0"/>
-              <a:t>)</a:t>
+              <a:t> O(2^n)</a:t>
             </a:r>
           </a:p>
           <a:p>
             <a:pPr lvl="1"/>
             <a:r>
               <a:rPr lang="en-US" dirty="0" smtClean="0"/>
-              <a:t>Brute force </a:t>
-            </a:r>
-            <a:r>
-              <a:rPr lang="en-US" smtClean="0"/>
-              <a:t>checking trillion </a:t>
-            </a:r>
-            <a:r>
-              <a:rPr lang="en-US" dirty="0" smtClean="0"/>
-              <a:t>routes/sec would still take &gt;</a:t>
-            </a:r>
-            <a:r>
-              <a:rPr lang="en-US" smtClean="0"/>
-              <a:t>20 billion </a:t>
-            </a:r>
-            <a:r>
-              <a:rPr lang="en-US" dirty="0" smtClean="0"/>
-              <a:t>years – 2^</a:t>
-            </a:r>
-            <a:r>
-              <a:rPr lang="en-US" smtClean="0"/>
-              <a:t>99 routes.</a:t>
-            </a:r>
-            <a:endParaRPr lang="en-US" dirty="0" smtClean="0"/>
+              <a:t>Brute force checking trillion routes/sec would still take &gt;20 billion years – 2^99 routes.</a:t>
+            </a:r>
           </a:p>
           <a:p>
             <a:pPr lvl="1"/>
@@ -4060,6 +4034,46 @@
             </a:r>
           </a:p>
           <a:p>
+            <a:pPr lvl="2"/>
+            <a:r>
+              <a:rPr lang="en-US" dirty="0" err="1" smtClean="0"/>
+              <a:t>CPython</a:t>
+            </a:r>
+            <a:r>
+              <a:rPr lang="en-US" dirty="0" smtClean="0"/>
+              <a:t> : </a:t>
+            </a:r>
+            <a:r>
+              <a:rPr lang="en-US" dirty="0" smtClean="0"/>
+              <a:t>1.1s, </a:t>
+            </a:r>
+            <a:r>
+              <a:rPr lang="en-US" dirty="0" err="1" smtClean="0"/>
+              <a:t>Jython</a:t>
+            </a:r>
+            <a:r>
+              <a:rPr lang="en-US" dirty="0" smtClean="0"/>
+              <a:t> : </a:t>
+            </a:r>
+            <a:r>
+              <a:rPr lang="en-US" dirty="0" smtClean="0"/>
+              <a:t>1.9s, </a:t>
+            </a:r>
+            <a:r>
+              <a:rPr lang="en-US" dirty="0" err="1" smtClean="0"/>
+              <a:t>PyPy</a:t>
+            </a:r>
+            <a:r>
+              <a:rPr lang="en-US" dirty="0" smtClean="0"/>
+              <a:t> </a:t>
+            </a:r>
+            <a:r>
+              <a:rPr lang="en-US" dirty="0" smtClean="0"/>
+              <a:t>: ~40ms</a:t>
+            </a:r>
+            <a:endParaRPr lang="en-US" dirty="0" smtClean="0"/>
+          </a:p>
+          <a:p>
             <a:pPr lvl="1"/>
             <a:r>
               <a:rPr lang="en-US" dirty="0"/>
@@ -4071,11 +4085,91 @@
             </a:r>
           </a:p>
           <a:p>
+            <a:pPr lvl="2"/>
+            <a:r>
+              <a:rPr lang="en-US" dirty="0" err="1" smtClean="0"/>
+              <a:t>CPython</a:t>
+            </a:r>
+            <a:r>
+              <a:rPr lang="en-US" dirty="0" smtClean="0"/>
+              <a:t> : </a:t>
+            </a:r>
+            <a:r>
+              <a:rPr lang="en-US" dirty="0" smtClean="0"/>
+              <a:t>~18ms, </a:t>
+            </a:r>
+            <a:r>
+              <a:rPr lang="en-US" dirty="0" err="1" smtClean="0"/>
+              <a:t>Jython</a:t>
+            </a:r>
+            <a:r>
+              <a:rPr lang="en-US" dirty="0" smtClean="0"/>
+              <a:t> : </a:t>
+            </a:r>
+            <a:r>
+              <a:rPr lang="en-US" dirty="0" smtClean="0"/>
+              <a:t>33ms, </a:t>
+            </a:r>
+            <a:r>
+              <a:rPr lang="en-US" dirty="0" err="1" smtClean="0"/>
+              <a:t>PyPy</a:t>
+            </a:r>
+            <a:r>
+              <a:rPr lang="en-US" dirty="0" smtClean="0"/>
+              <a:t> </a:t>
+            </a:r>
+            <a:r>
+              <a:rPr lang="en-US" dirty="0" smtClean="0"/>
+              <a:t>: ~8ms</a:t>
+            </a:r>
+            <a:endParaRPr lang="en-US" dirty="0" smtClean="0"/>
+          </a:p>
+          <a:p>
             <a:pPr lvl="1"/>
             <a:r>
               <a:rPr lang="en-US" dirty="0" smtClean="0"/>
               <a:t>Hash lookup – using more memory allows faster algorithm – memory/speed tradeoff</a:t>
             </a:r>
+          </a:p>
+          <a:p>
+            <a:pPr lvl="2"/>
+            <a:r>
+              <a:rPr lang="en-US" dirty="0" err="1" smtClean="0"/>
+              <a:t>CPython</a:t>
+            </a:r>
+            <a:r>
+              <a:rPr lang="en-US" dirty="0" smtClean="0"/>
+              <a:t> : </a:t>
+            </a:r>
+            <a:r>
+              <a:rPr lang="en-US" dirty="0" smtClean="0"/>
+              <a:t>~14ms, </a:t>
+            </a:r>
+            <a:r>
+              <a:rPr lang="en-US" dirty="0" err="1" smtClean="0"/>
+              <a:t>Jython</a:t>
+            </a:r>
+            <a:r>
+              <a:rPr lang="en-US" dirty="0" smtClean="0"/>
+              <a:t> : </a:t>
+            </a:r>
+            <a:r>
+              <a:rPr lang="en-US" dirty="0" smtClean="0"/>
+              <a:t>~19ms, </a:t>
+            </a:r>
+            <a:r>
+              <a:rPr lang="en-US" dirty="0" err="1" smtClean="0"/>
+              <a:t>PyPy</a:t>
+            </a:r>
+            <a:r>
+              <a:rPr lang="en-US" dirty="0" smtClean="0"/>
+              <a:t> </a:t>
+            </a:r>
+            <a:r>
+              <a:rPr lang="en-US" dirty="0" smtClean="0"/>
+              <a:t>: 4.3ms</a:t>
+            </a:r>
+            <a:endParaRPr lang="en-US" dirty="0" smtClean="0"/>
           </a:p>
         </p:txBody>
       </p:sp>
@@ -4133,7 +4227,7 @@
           <a:p>
             <a:r>
               <a:rPr lang="en-US" dirty="0" smtClean="0"/>
-              <a:t>Surprises</a:t>
+              <a:t>Surprises (1)</a:t>
             </a:r>
             <a:endParaRPr lang="en-US" dirty="0"/>
           </a:p>
@@ -4151,21 +4245,197 @@
         </p:nvSpPr>
         <p:spPr/>
         <p:txBody>
-          <a:bodyPr/>
-          <a:lstStyle/>
-          <a:p>
-            <a:r>
-              <a:rPr lang="en-US" dirty="0" smtClean="0"/>
-              <a:t>Modules aren’t always faster : prob009, prob028</a:t>
-            </a:r>
-          </a:p>
-          <a:p>
+          <a:bodyPr>
+            <a:normAutofit/>
+          </a:bodyPr>
+          <a:lstStyle/>
+          <a:p>
+            <a:r>
+              <a:rPr lang="en-US" dirty="0" smtClean="0"/>
+              <a:t>Modules aren’t always faster : </a:t>
+            </a:r>
+            <a:r>
+              <a:rPr lang="en-US" dirty="0" smtClean="0"/>
+              <a:t>prob028</a:t>
+            </a:r>
+          </a:p>
+          <a:p>
+            <a:pPr lvl="1"/>
+            <a:r>
+              <a:rPr lang="en-US" dirty="0"/>
+              <a:t>p</a:t>
+            </a:r>
+            <a:r>
+              <a:rPr lang="en-US" dirty="0" smtClean="0"/>
+              <a:t>rob009 – Pythagorean triplet</a:t>
+            </a:r>
+          </a:p>
+          <a:p>
+            <a:pPr lvl="2"/>
+            <a:r>
+              <a:rPr lang="en-US" dirty="0" err="1" smtClean="0"/>
+              <a:t>CPython</a:t>
+            </a:r>
+            <a:r>
+              <a:rPr lang="en-US" dirty="0" smtClean="0"/>
+              <a:t> : ~2ms, </a:t>
+            </a:r>
             <a:r>
               <a:rPr lang="en-US" dirty="0" err="1" smtClean="0"/>
               <a:t>Jython</a:t>
             </a:r>
             <a:r>
               <a:rPr lang="en-US" dirty="0" smtClean="0"/>
+              <a:t> : 1ms, </a:t>
+            </a:r>
+            <a:r>
+              <a:rPr lang="en-US" dirty="0" err="1" smtClean="0"/>
+              <a:t>PyPy</a:t>
+            </a:r>
+            <a:r>
+              <a:rPr lang="en-US" dirty="0" smtClean="0"/>
+              <a:t> : .1ms</a:t>
+            </a:r>
+          </a:p>
+          <a:p>
+            <a:pPr lvl="2"/>
+            <a:r>
+              <a:rPr lang="en-US" dirty="0" smtClean="0"/>
+              <a:t>Integer equations are “</a:t>
+            </a:r>
+            <a:r>
+              <a:rPr lang="en-US" dirty="0" err="1" smtClean="0"/>
+              <a:t>diophantine</a:t>
+            </a:r>
+            <a:r>
+              <a:rPr lang="en-US" dirty="0" smtClean="0"/>
+              <a:t>”, and </a:t>
+            </a:r>
+            <a:r>
+              <a:rPr lang="en-US" dirty="0" err="1" smtClean="0"/>
+              <a:t>SymPy</a:t>
+            </a:r>
+            <a:r>
+              <a:rPr lang="en-US" dirty="0" smtClean="0"/>
+              <a:t> has a </a:t>
+            </a:r>
+            <a:r>
+              <a:rPr lang="en-US" dirty="0" err="1" smtClean="0"/>
+              <a:t>diophantine</a:t>
+            </a:r>
+            <a:r>
+              <a:rPr lang="en-US" dirty="0" smtClean="0"/>
+              <a:t> solver:</a:t>
+            </a:r>
+          </a:p>
+          <a:p>
+            <a:pPr lvl="2"/>
+            <a:r>
+              <a:rPr lang="en-US" dirty="0" err="1" smtClean="0"/>
+              <a:t>CPython</a:t>
+            </a:r>
+            <a:r>
+              <a:rPr lang="en-US" dirty="0" smtClean="0"/>
+              <a:t> : ~29ms, and no </a:t>
+            </a:r>
+            <a:r>
+              <a:rPr lang="en-US" dirty="0" err="1" smtClean="0"/>
+              <a:t>Jython</a:t>
+            </a:r>
+            <a:r>
+              <a:rPr lang="en-US" dirty="0" smtClean="0"/>
+              <a:t> or </a:t>
+            </a:r>
+            <a:r>
+              <a:rPr lang="en-US" dirty="0" err="1" smtClean="0"/>
+              <a:t>PyPy</a:t>
+            </a:r>
+            <a:r>
+              <a:rPr lang="en-US" dirty="0" smtClean="0"/>
+              <a:t> support</a:t>
+            </a:r>
+          </a:p>
+          <a:p>
+            <a:pPr lvl="1"/>
+            <a:r>
+              <a:rPr lang="en-US" dirty="0"/>
+              <a:t>p</a:t>
+            </a:r>
+            <a:r>
+              <a:rPr lang="en-US" dirty="0" smtClean="0"/>
+              <a:t>rob028 – spiral array</a:t>
+            </a:r>
+          </a:p>
+          <a:p>
+            <a:pPr lvl="2"/>
+            <a:r>
+              <a:rPr lang="en-US" dirty="0" err="1" smtClean="0"/>
+              <a:t>CPython</a:t>
+            </a:r>
+            <a:r>
+              <a:rPr lang="en-US" dirty="0" smtClean="0"/>
+              <a:t> : ~.3s, </a:t>
+            </a:r>
+            <a:r>
+              <a:rPr lang="en-US" dirty="0" err="1" smtClean="0"/>
+              <a:t>Jython</a:t>
+            </a:r>
+            <a:r>
+              <a:rPr lang="en-US" dirty="0" smtClean="0"/>
+              <a:t> : ~.22s, </a:t>
+            </a:r>
+            <a:r>
+              <a:rPr lang="en-US" dirty="0" err="1" smtClean="0"/>
+              <a:t>PyPy</a:t>
+            </a:r>
+            <a:r>
+              <a:rPr lang="en-US" dirty="0" smtClean="0"/>
+              <a:t> : ~.12s</a:t>
+            </a:r>
+          </a:p>
+          <a:p>
+            <a:pPr lvl="2"/>
+            <a:r>
+              <a:rPr lang="en-US" dirty="0" smtClean="0"/>
+              <a:t>Using </a:t>
+            </a:r>
+            <a:r>
+              <a:rPr lang="en-US" dirty="0" err="1" smtClean="0"/>
+              <a:t>NumPy</a:t>
+            </a:r>
+            <a:r>
+              <a:rPr lang="en-US" dirty="0" smtClean="0"/>
+              <a:t> : </a:t>
+            </a:r>
+            <a:r>
+              <a:rPr lang="en-US" dirty="0" err="1" smtClean="0"/>
+              <a:t>CPython</a:t>
+            </a:r>
+            <a:r>
+              <a:rPr lang="en-US" dirty="0" smtClean="0"/>
+              <a:t> : ~.9s, no </a:t>
+            </a:r>
+            <a:r>
+              <a:rPr lang="en-US" dirty="0" err="1" smtClean="0"/>
+              <a:t>Jython</a:t>
+            </a:r>
+            <a:r>
+              <a:rPr lang="en-US" dirty="0" smtClean="0"/>
+              <a:t> or </a:t>
+            </a:r>
+            <a:r>
+              <a:rPr lang="en-US" dirty="0" err="1" smtClean="0"/>
+              <a:t>PyPy</a:t>
+            </a:r>
+            <a:endParaRPr lang="en-US" dirty="0" smtClean="0"/>
+          </a:p>
+          <a:p>
+            <a:r>
+              <a:rPr lang="en-US" dirty="0" err="1" smtClean="0"/>
+              <a:t>Jython</a:t>
+            </a:r>
+            <a:r>
+              <a:rPr lang="en-US" dirty="0" smtClean="0"/>
               <a:t> and </a:t>
             </a:r>
             <a:r>
@@ -4174,11 +4444,7 @@
             </a:r>
             <a:r>
               <a:rPr lang="en-US" dirty="0" smtClean="0"/>
-              <a:t> aren’t always faster </a:t>
-            </a:r>
-            <a:r>
-              <a:rPr lang="en-US" smtClean="0"/>
-              <a:t>: prob040</a:t>
+              <a:t> aren’t always faster : prob040</a:t>
             </a:r>
             <a:endParaRPr lang="en-US" dirty="0"/>
           </a:p>
@@ -4238,7 +4504,7 @@
           <a:p>
             <a:r>
               <a:rPr lang="en-US" dirty="0" smtClean="0"/>
-              <a:t>Sailing Over the Edge</a:t>
+              <a:t>Surprises (2)</a:t>
             </a:r>
             <a:endParaRPr lang="en-US" dirty="0"/>
           </a:p>
@@ -4256,52 +4522,149 @@
         </p:nvSpPr>
         <p:spPr/>
         <p:txBody>
-          <a:bodyPr/>
-          <a:lstStyle/>
-          <a:p>
-            <a:r>
-              <a:rPr lang="en-US" dirty="0" err="1" smtClean="0"/>
-              <a:t>Cython</a:t>
+          <a:bodyPr>
+            <a:normAutofit/>
+          </a:bodyPr>
+          <a:lstStyle/>
+          <a:p>
+            <a:r>
+              <a:rPr lang="en-US" dirty="0" err="1" smtClean="0"/>
+              <a:t>Jython</a:t>
+            </a:r>
+            <a:r>
+              <a:rPr lang="en-US" dirty="0" smtClean="0"/>
+              <a:t> </a:t>
+            </a:r>
+            <a:r>
+              <a:rPr lang="en-US" dirty="0" smtClean="0"/>
+              <a:t>and </a:t>
+            </a:r>
+            <a:r>
+              <a:rPr lang="en-US" dirty="0" err="1" smtClean="0"/>
+              <a:t>PyPy</a:t>
+            </a:r>
+            <a:r>
+              <a:rPr lang="en-US" dirty="0" smtClean="0"/>
+              <a:t> aren’t always faster : </a:t>
+            </a:r>
+            <a:r>
+              <a:rPr lang="en-US" dirty="0" smtClean="0"/>
+              <a:t>prob040</a:t>
+            </a:r>
+          </a:p>
+          <a:p>
+            <a:pPr lvl="1"/>
+            <a:r>
+              <a:rPr lang="en-US" dirty="0" smtClean="0"/>
+              <a:t>Smaller problem (limit = 5)</a:t>
+            </a:r>
+          </a:p>
+          <a:p>
+            <a:pPr lvl="2"/>
+            <a:r>
+              <a:rPr lang="en-US" dirty="0" err="1" smtClean="0"/>
+              <a:t>CPython</a:t>
+            </a:r>
+            <a:r>
+              <a:rPr lang="en-US" dirty="0" smtClean="0"/>
+              <a:t> : ~30ms, </a:t>
+            </a:r>
+            <a:r>
+              <a:rPr lang="en-US" dirty="0" err="1" smtClean="0"/>
+              <a:t>Jython</a:t>
+            </a:r>
+            <a:r>
+              <a:rPr lang="en-US" dirty="0" smtClean="0"/>
+              <a:t> : ~7s, </a:t>
+            </a:r>
+            <a:r>
+              <a:rPr lang="en-US" dirty="0" err="1" smtClean="0"/>
+              <a:t>PyPy</a:t>
+            </a:r>
+            <a:r>
+              <a:rPr lang="en-US" dirty="0" smtClean="0"/>
+              <a:t> : ~11s</a:t>
+            </a:r>
+          </a:p>
+          <a:p>
+            <a:pPr lvl="1"/>
+            <a:r>
+              <a:rPr lang="en-US" dirty="0" smtClean="0"/>
+              <a:t>Full problem (limit = 6)</a:t>
+            </a:r>
+          </a:p>
+          <a:p>
+            <a:pPr lvl="2"/>
+            <a:r>
+              <a:rPr lang="en-US" dirty="0" err="1" smtClean="0"/>
+              <a:t>CPython</a:t>
+            </a:r>
+            <a:r>
+              <a:rPr lang="en-US" dirty="0" smtClean="0"/>
+              <a:t> : ~300ms</a:t>
+            </a:r>
+          </a:p>
+          <a:p>
+            <a:pPr lvl="2"/>
+            <a:r>
+              <a:rPr lang="en-US" dirty="0" err="1" smtClean="0"/>
+              <a:t>Jython</a:t>
+            </a:r>
+            <a:r>
+              <a:rPr lang="en-US" dirty="0" smtClean="0"/>
+              <a:t> and </a:t>
+            </a:r>
+            <a:r>
+              <a:rPr lang="en-US" dirty="0" err="1" smtClean="0"/>
+              <a:t>PyPy</a:t>
+            </a:r>
+            <a:r>
+              <a:rPr lang="en-US" dirty="0" smtClean="0"/>
+              <a:t> take 15-20 </a:t>
+            </a:r>
+            <a:r>
+              <a:rPr lang="en-US" dirty="0" err="1" smtClean="0"/>
+              <a:t>mins</a:t>
             </a:r>
             <a:endParaRPr lang="en-US" dirty="0" smtClean="0"/>
           </a:p>
           <a:p>
-            <a:r>
-              <a:rPr lang="en-US" dirty="0" smtClean="0"/>
-              <a:t>Multiprocessing</a:t>
-            </a:r>
-          </a:p>
-          <a:p>
             <a:pPr lvl="1"/>
             <a:r>
               <a:rPr lang="en-US" dirty="0" smtClean="0"/>
-              <a:t>The GIL</a:t>
+              <a:t>Major string construction and destruction</a:t>
             </a:r>
           </a:p>
           <a:p>
             <a:pPr lvl="1"/>
             <a:r>
               <a:rPr lang="en-US" dirty="0" err="1" smtClean="0"/>
-              <a:t>Jython</a:t>
-            </a:r>
-            <a:r>
-              <a:rPr lang="en-US" dirty="0" smtClean="0"/>
-              <a:t> – no GIL – true multithreading</a:t>
-            </a:r>
-            <a:endParaRPr lang="en-US" dirty="0"/>
+              <a:t>CPython</a:t>
+            </a:r>
+            <a:r>
+              <a:rPr lang="en-US" dirty="0" smtClean="0"/>
+              <a:t> uses reference counting, while the others use garbage collection – perhaps the difference is in how the string memory is managed?</a:t>
+            </a:r>
           </a:p>
         </p:txBody>
       </p:sp>
     </p:spTree>
     <p:extLst>
       <p:ext uri="{BB962C8B-B14F-4D97-AF65-F5344CB8AC3E}">
-        <p14:creationId xmlns:p14="http://schemas.microsoft.com/office/powerpoint/2010/main" val="3906047054"/>
+        <p14:creationId xmlns:p14="http://schemas.microsoft.com/office/powerpoint/2010/main" val="4079205961"/>
       </p:ext>
     </p:extLst>
   </p:cSld>
   <p:clrMapOvr>
     <a:masterClrMapping/>
   </p:clrMapOvr>
+  <p:timing>
+    <p:tnLst>
+      <p:par>
+        <p:cTn xmlns:p14="http://schemas.microsoft.com/office/powerpoint/2010/main" id="1" dur="indefinite" restart="never" nodeType="tmRoot"/>
+      </p:par>
+    </p:tnLst>
+  </p:timing>
 </p:sld>
 </file>
 
@@ -4338,6 +4701,123 @@
           <a:lstStyle/>
           <a:p>
             <a:r>
+              <a:rPr lang="en-US" dirty="0" smtClean="0"/>
+              <a:t>Sailing Over the Edge</a:t>
+            </a:r>
+            <a:endParaRPr lang="en-US" dirty="0"/>
+          </a:p>
+        </p:txBody>
+      </p:sp>
+      <p:sp>
+        <p:nvSpPr>
+          <p:cNvPr id="3" name="Content Placeholder 2"/>
+          <p:cNvSpPr>
+            <a:spLocks noGrp="1"/>
+          </p:cNvSpPr>
+          <p:nvPr>
+            <p:ph idx="1"/>
+          </p:nvPr>
+        </p:nvSpPr>
+        <p:spPr/>
+        <p:txBody>
+          <a:bodyPr/>
+          <a:lstStyle/>
+          <a:p>
+            <a:r>
+              <a:rPr lang="en-US" dirty="0" err="1" smtClean="0"/>
+              <a:t>Cython</a:t>
+            </a:r>
+            <a:r>
+              <a:rPr lang="en-US" dirty="0" smtClean="0"/>
+              <a:t> – Python compiled </a:t>
+            </a:r>
+            <a:r>
+              <a:rPr lang="en-US" dirty="0" smtClean="0"/>
+              <a:t>to C, which is then compiled to a </a:t>
+            </a:r>
+            <a:r>
+              <a:rPr lang="en-US" smtClean="0"/>
+              <a:t>CPython</a:t>
+            </a:r>
+            <a:r>
+              <a:rPr lang="en-US" dirty="0" smtClean="0"/>
+              <a:t> module</a:t>
+            </a:r>
+            <a:endParaRPr lang="en-US" dirty="0" smtClean="0"/>
+          </a:p>
+          <a:p>
+            <a:r>
+              <a:rPr lang="en-US" dirty="0" smtClean="0"/>
+              <a:t>Multiprocessing</a:t>
+            </a:r>
+          </a:p>
+          <a:p>
+            <a:pPr lvl="1"/>
+            <a:r>
+              <a:rPr lang="en-US" dirty="0" smtClean="0"/>
+              <a:t>The GIL</a:t>
+            </a:r>
+          </a:p>
+          <a:p>
+            <a:pPr lvl="1"/>
+            <a:r>
+              <a:rPr lang="en-US" dirty="0" err="1" smtClean="0"/>
+              <a:t>Jython</a:t>
+            </a:r>
+            <a:r>
+              <a:rPr lang="en-US" dirty="0" smtClean="0"/>
+              <a:t> – no GIL – true multithreading</a:t>
+            </a:r>
+            <a:endParaRPr lang="en-US" dirty="0"/>
+          </a:p>
+        </p:txBody>
+      </p:sp>
+    </p:spTree>
+    <p:extLst>
+      <p:ext uri="{BB962C8B-B14F-4D97-AF65-F5344CB8AC3E}">
+        <p14:creationId xmlns:p14="http://schemas.microsoft.com/office/powerpoint/2010/main" val="3906047054"/>
+      </p:ext>
+    </p:extLst>
+  </p:cSld>
+  <p:clrMapOvr>
+    <a:masterClrMapping/>
+  </p:clrMapOvr>
+</p:sld>
+</file>
+
+<file path=ppt/slides/slide15.xml><?xml version="1.0" encoding="utf-8"?>
+<p:sld xmlns:a="http://schemas.openxmlformats.org/drawingml/2006/main" xmlns:r="http://schemas.openxmlformats.org/officeDocument/2006/relationships" xmlns:p="http://schemas.openxmlformats.org/presentationml/2006/main">
+  <p:cSld>
+    <p:spTree>
+      <p:nvGrpSpPr>
+        <p:cNvPr id="1" name=""/>
+        <p:cNvGrpSpPr/>
+        <p:nvPr/>
+      </p:nvGrpSpPr>
+      <p:grpSpPr>
+        <a:xfrm>
+          <a:off x="0" y="0"/>
+          <a:ext cx="0" cy="0"/>
+          <a:chOff x="0" y="0"/>
+          <a:chExt cx="0" cy="0"/>
+        </a:xfrm>
+      </p:grpSpPr>
+      <p:sp>
+        <p:nvSpPr>
+          <p:cNvPr id="2" name="Title 1"/>
+          <p:cNvSpPr>
+            <a:spLocks noGrp="1"/>
+          </p:cNvSpPr>
+          <p:nvPr>
+            <p:ph type="title"/>
+          </p:nvPr>
+        </p:nvSpPr>
+        <p:spPr/>
+        <p:txBody>
+          <a:bodyPr/>
+          <a:lstStyle/>
+          <a:p>
+            <a:r>
               <a:rPr lang="en-US" dirty="0" smtClean="0">
                 <a:latin typeface="Apple Chancery"/>
               </a:rPr>
@@ -4429,7 +4909,7 @@
 </p:sld>
 </file>
 
-<file path=ppt/slides/slide15.xml><?xml version="1.0" encoding="utf-8"?>
+<file path=ppt/slides/slide16.xml><?xml version="1.0" encoding="utf-8"?>
 <p:sld xmlns:a="http://schemas.openxmlformats.org/drawingml/2006/main" xmlns:r="http://schemas.openxmlformats.org/officeDocument/2006/relationships" xmlns:p="http://schemas.openxmlformats.org/presentationml/2006/main">
   <p:cSld>
     <p:spTree>
@@ -5532,7 +6012,11 @@
             <a:pPr lvl="2"/>
             <a:r>
               <a:rPr lang="en-US" dirty="0" smtClean="0"/>
-              <a:t>.5ms with loop of 100x – </a:t>
+              <a:t>Module is .</a:t>
+            </a:r>
+            <a:r>
+              <a:rPr lang="en-US" dirty="0" smtClean="0"/>
+              <a:t>5ms with loop of 100x – </a:t>
             </a:r>
             <a:r>
               <a:rPr lang="en-US" dirty="0" err="1" smtClean="0"/>
@@ -5690,8 +6174,28 @@
             </a:r>
             <a:r>
               <a:rPr lang="en-US" dirty="0" smtClean="0"/>
-              <a:t> : .12ms</a:t>
-            </a:r>
+              <a:t> : .</a:t>
+            </a:r>
+            <a:r>
+              <a:rPr lang="en-US" dirty="0" smtClean="0"/>
+              <a:t>12ms</a:t>
+            </a:r>
+          </a:p>
+          <a:p>
+            <a:pPr lvl="2"/>
+            <a:r>
+              <a:rPr lang="en-US" dirty="0" smtClean="0"/>
+              <a:t>Note that </a:t>
+            </a:r>
+            <a:r>
+              <a:rPr lang="en-US" dirty="0" err="1" smtClean="0"/>
+              <a:t>Jython</a:t>
+            </a:r>
+            <a:r>
+              <a:rPr lang="en-US" dirty="0" smtClean="0"/>
+              <a:t> was 10x slower – module call overhead from Java?</a:t>
+            </a:r>
+            <a:endParaRPr lang="en-US" dirty="0" smtClean="0"/>
           </a:p>
           <a:p>
             <a:r>

</xml_diff>

<commit_message>
Add use of StringBuffer in Jython, and joining lists for Python to prob40
</commit_message>
<xml_diff>
--- a/Python Performance Talk.pptx
+++ b/Python Performance Talk.pptx
@@ -18,9 +18,10 @@
     <p:sldId id="266" r:id="rId12"/>
     <p:sldId id="265" r:id="rId13"/>
     <p:sldId id="271" r:id="rId14"/>
-    <p:sldId id="269" r:id="rId15"/>
-    <p:sldId id="268" r:id="rId16"/>
-    <p:sldId id="267" r:id="rId17"/>
+    <p:sldId id="272" r:id="rId15"/>
+    <p:sldId id="269" r:id="rId16"/>
+    <p:sldId id="268" r:id="rId17"/>
+    <p:sldId id="267" r:id="rId18"/>
   </p:sldIdLst>
   <p:sldSz cx="9144000" cy="6858000" type="screen4x3"/>
   <p:notesSz cx="6858000" cy="9144000"/>
@@ -405,7 +406,7 @@
           <a:p>
             <a:fld id="{B01F9CA3-105E-4857-9057-6DB6197DA786}" type="datetimeFigureOut">
               <a:rPr lang="en-US" smtClean="0"/>
-              <a:t>5/31/17</a:t>
+              <a:t>6/13/17</a:t>
             </a:fld>
             <a:endParaRPr lang="en-US"/>
           </a:p>
@@ -597,7 +598,7 @@
           <a:p>
             <a:fld id="{B01F9CA3-105E-4857-9057-6DB6197DA786}" type="datetimeFigureOut">
               <a:rPr lang="en-US" smtClean="0"/>
-              <a:t>5/31/17</a:t>
+              <a:t>6/13/17</a:t>
             </a:fld>
             <a:endParaRPr lang="en-US"/>
           </a:p>
@@ -866,7 +867,7 @@
           <a:p>
             <a:fld id="{B01F9CA3-105E-4857-9057-6DB6197DA786}" type="datetimeFigureOut">
               <a:rPr lang="en-US" smtClean="0"/>
-              <a:t>5/31/17</a:t>
+              <a:t>6/13/17</a:t>
             </a:fld>
             <a:endParaRPr lang="en-US"/>
           </a:p>
@@ -1045,7 +1046,7 @@
           <a:p>
             <a:fld id="{B01F9CA3-105E-4857-9057-6DB6197DA786}" type="datetimeFigureOut">
               <a:rPr lang="en-US" smtClean="0"/>
-              <a:t>5/31/17</a:t>
+              <a:t>6/13/17</a:t>
             </a:fld>
             <a:endParaRPr lang="en-US"/>
           </a:p>
@@ -1214,7 +1215,7 @@
           <a:p>
             <a:fld id="{B01F9CA3-105E-4857-9057-6DB6197DA786}" type="datetimeFigureOut">
               <a:rPr lang="en-US" smtClean="0"/>
-              <a:t>5/31/17</a:t>
+              <a:t>6/13/17</a:t>
             </a:fld>
             <a:endParaRPr lang="en-US"/>
           </a:p>
@@ -1456,7 +1457,7 @@
           <a:p>
             <a:fld id="{B01F9CA3-105E-4857-9057-6DB6197DA786}" type="datetimeFigureOut">
               <a:rPr lang="en-US" smtClean="0"/>
-              <a:t>5/31/17</a:t>
+              <a:t>6/13/17</a:t>
             </a:fld>
             <a:endParaRPr lang="en-US"/>
           </a:p>
@@ -1779,7 +1780,7 @@
           <a:p>
             <a:fld id="{B01F9CA3-105E-4857-9057-6DB6197DA786}" type="datetimeFigureOut">
               <a:rPr lang="en-US" smtClean="0"/>
-              <a:t>5/31/17</a:t>
+              <a:t>6/13/17</a:t>
             </a:fld>
             <a:endParaRPr lang="en-US"/>
           </a:p>
@@ -2077,7 +2078,7 @@
           <a:p>
             <a:fld id="{B01F9CA3-105E-4857-9057-6DB6197DA786}" type="datetimeFigureOut">
               <a:rPr lang="en-US" smtClean="0"/>
-              <a:t>5/31/17</a:t>
+              <a:t>6/13/17</a:t>
             </a:fld>
             <a:endParaRPr lang="en-US"/>
           </a:p>
@@ -2533,7 +2534,7 @@
           <a:p>
             <a:fld id="{B01F9CA3-105E-4857-9057-6DB6197DA786}" type="datetimeFigureOut">
               <a:rPr lang="en-US" smtClean="0"/>
-              <a:t>5/31/17</a:t>
+              <a:t>6/13/17</a:t>
             </a:fld>
             <a:endParaRPr lang="en-US"/>
           </a:p>
@@ -2646,7 +2647,7 @@
           <a:p>
             <a:fld id="{B01F9CA3-105E-4857-9057-6DB6197DA786}" type="datetimeFigureOut">
               <a:rPr lang="en-US" smtClean="0"/>
-              <a:t>5/31/17</a:t>
+              <a:t>6/13/17</a:t>
             </a:fld>
             <a:endParaRPr lang="en-US"/>
           </a:p>
@@ -2736,7 +2737,7 @@
           <a:p>
             <a:fld id="{B01F9CA3-105E-4857-9057-6DB6197DA786}" type="datetimeFigureOut">
               <a:rPr lang="en-US" smtClean="0"/>
-              <a:t>5/31/17</a:t>
+              <a:t>6/13/17</a:t>
             </a:fld>
             <a:endParaRPr lang="en-US"/>
           </a:p>
@@ -3018,7 +3019,7 @@
           <a:p>
             <a:fld id="{B01F9CA3-105E-4857-9057-6DB6197DA786}" type="datetimeFigureOut">
               <a:rPr lang="en-US" smtClean="0"/>
-              <a:t>5/31/17</a:t>
+              <a:t>6/13/17</a:t>
             </a:fld>
             <a:endParaRPr lang="en-US"/>
           </a:p>
@@ -3224,7 +3225,7 @@
           <a:p>
             <a:fld id="{B01F9CA3-105E-4857-9057-6DB6197DA786}" type="datetimeFigureOut">
               <a:rPr lang="en-US" smtClean="0"/>
-              <a:t>5/31/17</a:t>
+              <a:t>6/13/17</a:t>
             </a:fld>
             <a:endParaRPr lang="en-US"/>
           </a:p>
@@ -3894,11 +3895,7 @@
             </a:r>
             <a:r>
               <a:rPr lang="en-US" dirty="0" smtClean="0"/>
-              <a:t>rob018, prob067 – O</a:t>
-            </a:r>
-            <a:r>
-              <a:rPr lang="en-US" dirty="0" smtClean="0"/>
-              <a:t>(n^2) </a:t>
+              <a:t>rob018, prob067 – O(n^2) </a:t>
             </a:r>
             <a:r>
               <a:rPr lang="en-US" dirty="0" err="1" smtClean="0"/>
@@ -4041,11 +4038,7 @@
             </a:r>
             <a:r>
               <a:rPr lang="en-US" dirty="0" smtClean="0"/>
-              <a:t> : </a:t>
-            </a:r>
-            <a:r>
-              <a:rPr lang="en-US" dirty="0" smtClean="0"/>
-              <a:t>1.1s, </a:t>
+              <a:t> : 1.1s, </a:t>
             </a:r>
             <a:r>
               <a:rPr lang="en-US" dirty="0" err="1" smtClean="0"/>
@@ -4053,11 +4046,7 @@
             </a:r>
             <a:r>
               <a:rPr lang="en-US" dirty="0" smtClean="0"/>
-              <a:t> : </a:t>
-            </a:r>
-            <a:r>
-              <a:rPr lang="en-US" dirty="0" smtClean="0"/>
-              <a:t>1.9s, </a:t>
+              <a:t> : 1.9s, </a:t>
             </a:r>
             <a:r>
               <a:rPr lang="en-US" dirty="0" err="1" smtClean="0"/>
@@ -4065,13 +4054,8 @@
             </a:r>
             <a:r>
               <a:rPr lang="en-US" dirty="0" smtClean="0"/>
-              <a:t> </a:t>
-            </a:r>
-            <a:r>
-              <a:rPr lang="en-US" dirty="0" smtClean="0"/>
-              <a:t>: ~40ms</a:t>
-            </a:r>
-            <a:endParaRPr lang="en-US" dirty="0" smtClean="0"/>
+              <a:t> : ~40ms</a:t>
+            </a:r>
           </a:p>
           <a:p>
             <a:pPr lvl="1"/>
@@ -4092,11 +4076,7 @@
             </a:r>
             <a:r>
               <a:rPr lang="en-US" dirty="0" smtClean="0"/>
-              <a:t> : </a:t>
-            </a:r>
-            <a:r>
-              <a:rPr lang="en-US" dirty="0" smtClean="0"/>
-              <a:t>~18ms, </a:t>
+              <a:t> : ~18ms, </a:t>
             </a:r>
             <a:r>
               <a:rPr lang="en-US" dirty="0" err="1" smtClean="0"/>
@@ -4104,11 +4084,7 @@
             </a:r>
             <a:r>
               <a:rPr lang="en-US" dirty="0" smtClean="0"/>
-              <a:t> : </a:t>
-            </a:r>
-            <a:r>
-              <a:rPr lang="en-US" dirty="0" smtClean="0"/>
-              <a:t>33ms, </a:t>
+              <a:t> : 33ms, </a:t>
             </a:r>
             <a:r>
               <a:rPr lang="en-US" dirty="0" err="1" smtClean="0"/>
@@ -4116,13 +4092,8 @@
             </a:r>
             <a:r>
               <a:rPr lang="en-US" dirty="0" smtClean="0"/>
-              <a:t> </a:t>
-            </a:r>
-            <a:r>
-              <a:rPr lang="en-US" dirty="0" smtClean="0"/>
-              <a:t>: ~8ms</a:t>
-            </a:r>
-            <a:endParaRPr lang="en-US" dirty="0" smtClean="0"/>
+              <a:t> : ~8ms</a:t>
+            </a:r>
           </a:p>
           <a:p>
             <a:pPr lvl="1"/>
@@ -4139,11 +4110,7 @@
             </a:r>
             <a:r>
               <a:rPr lang="en-US" dirty="0" smtClean="0"/>
-              <a:t> : </a:t>
-            </a:r>
-            <a:r>
-              <a:rPr lang="en-US" dirty="0" smtClean="0"/>
-              <a:t>~14ms, </a:t>
+              <a:t> : ~14ms, </a:t>
             </a:r>
             <a:r>
               <a:rPr lang="en-US" dirty="0" err="1" smtClean="0"/>
@@ -4151,11 +4118,7 @@
             </a:r>
             <a:r>
               <a:rPr lang="en-US" dirty="0" smtClean="0"/>
-              <a:t> : </a:t>
-            </a:r>
-            <a:r>
-              <a:rPr lang="en-US" dirty="0" smtClean="0"/>
-              <a:t>~19ms, </a:t>
+              <a:t> : ~19ms, </a:t>
             </a:r>
             <a:r>
               <a:rPr lang="en-US" dirty="0" err="1" smtClean="0"/>
@@ -4163,13 +4126,8 @@
             </a:r>
             <a:r>
               <a:rPr lang="en-US" dirty="0" smtClean="0"/>
-              <a:t> </a:t>
-            </a:r>
-            <a:r>
-              <a:rPr lang="en-US" dirty="0" smtClean="0"/>
-              <a:t>: 4.3ms</a:t>
-            </a:r>
-            <a:endParaRPr lang="en-US" dirty="0" smtClean="0"/>
+              <a:t> : 4.3ms</a:t>
+            </a:r>
           </a:p>
         </p:txBody>
       </p:sp>
@@ -4252,11 +4210,7 @@
           <a:p>
             <a:r>
               <a:rPr lang="en-US" dirty="0" smtClean="0"/>
-              <a:t>Modules aren’t always faster : </a:t>
-            </a:r>
-            <a:r>
-              <a:rPr lang="en-US" dirty="0" smtClean="0"/>
-              <a:t>prob028</a:t>
+              <a:t>Modules aren’t always faster : prob028</a:t>
             </a:r>
           </a:p>
           <a:p>
@@ -4533,11 +4487,7 @@
             </a:r>
             <a:r>
               <a:rPr lang="en-US" dirty="0" smtClean="0"/>
-              <a:t> </a:t>
-            </a:r>
-            <a:r>
-              <a:rPr lang="en-US" dirty="0" smtClean="0"/>
-              <a:t>and </a:t>
+              <a:t> and </a:t>
             </a:r>
             <a:r>
               <a:rPr lang="en-US" dirty="0" err="1" smtClean="0"/>
@@ -4545,11 +4495,7 @@
             </a:r>
             <a:r>
               <a:rPr lang="en-US" dirty="0" smtClean="0"/>
-              <a:t> aren’t always faster : </a:t>
-            </a:r>
-            <a:r>
-              <a:rPr lang="en-US" dirty="0" smtClean="0"/>
-              <a:t>prob040</a:t>
+              <a:t> aren’t always faster : prob040</a:t>
             </a:r>
           </a:p>
           <a:p>
@@ -4702,7 +4648,7 @@
           <a:p>
             <a:r>
               <a:rPr lang="en-US" dirty="0" smtClean="0"/>
-              <a:t>Sailing Over the Edge</a:t>
+              <a:t>NEWSFLASH!!</a:t>
             </a:r>
             <a:endParaRPr lang="en-US" dirty="0"/>
           </a:p>
@@ -4720,68 +4666,130 @@
         </p:nvSpPr>
         <p:spPr/>
         <p:txBody>
-          <a:bodyPr/>
-          <a:lstStyle/>
-          <a:p>
-            <a:r>
-              <a:rPr lang="en-US" dirty="0" err="1" smtClean="0"/>
-              <a:t>Cython</a:t>
-            </a:r>
-            <a:r>
-              <a:rPr lang="en-US" dirty="0" smtClean="0"/>
-              <a:t> – Python compiled </a:t>
-            </a:r>
-            <a:r>
-              <a:rPr lang="en-US" dirty="0" smtClean="0"/>
-              <a:t>to C, which is then compiled to a </a:t>
-            </a:r>
-            <a:r>
-              <a:rPr lang="en-US" smtClean="0"/>
+          <a:bodyPr>
+            <a:normAutofit/>
+          </a:bodyPr>
+          <a:lstStyle/>
+          <a:p>
+            <a:r>
+              <a:rPr lang="en-US" dirty="0" smtClean="0"/>
+              <a:t>Just in Today!!  Can use </a:t>
+            </a:r>
+            <a:r>
+              <a:rPr lang="en-US" dirty="0" err="1" smtClean="0"/>
+              <a:t>java.lang.StringBuffer</a:t>
+            </a:r>
+            <a:r>
+              <a:rPr lang="en-US" dirty="0" smtClean="0"/>
+              <a:t> in </a:t>
+            </a:r>
+            <a:r>
+              <a:rPr lang="en-US" dirty="0" err="1" smtClean="0"/>
+              <a:t>Jython</a:t>
+            </a:r>
+            <a:r>
+              <a:rPr lang="en-US" dirty="0" smtClean="0"/>
+              <a:t>, or can build list and “join” to get better GC results.</a:t>
+            </a:r>
+          </a:p>
+          <a:p>
+            <a:pPr lvl="1"/>
+            <a:r>
+              <a:rPr lang="en-US" dirty="0" err="1" smtClean="0"/>
+              <a:t>Java.lang.StringBuffer</a:t>
+            </a:r>
+            <a:r>
+              <a:rPr lang="en-US" dirty="0" smtClean="0"/>
+              <a:t> – </a:t>
+            </a:r>
+            <a:r>
+              <a:rPr lang="en-US" dirty="0" err="1" smtClean="0"/>
+              <a:t>Jython</a:t>
+            </a:r>
+            <a:r>
+              <a:rPr lang="en-US" dirty="0" smtClean="0"/>
+              <a:t> only : ~640ms</a:t>
+            </a:r>
+          </a:p>
+          <a:p>
+            <a:pPr lvl="1"/>
+            <a:r>
+              <a:rPr lang="en-US" dirty="0" smtClean="0"/>
+              <a:t>“join” a list – universal:</a:t>
+            </a:r>
+          </a:p>
+          <a:p>
+            <a:pPr lvl="2"/>
+            <a:r>
+              <a:rPr lang="en-US" dirty="0" err="1" smtClean="0"/>
               <a:t>CPython</a:t>
             </a:r>
             <a:r>
               <a:rPr lang="en-US" dirty="0" smtClean="0"/>
-              <a:t> module</a:t>
+              <a:t> : ~305ms</a:t>
+            </a:r>
+          </a:p>
+          <a:p>
+            <a:pPr lvl="2"/>
+            <a:r>
+              <a:rPr lang="en-US" dirty="0" err="1" smtClean="0"/>
+              <a:t>Jython</a:t>
+            </a:r>
+            <a:r>
+              <a:rPr lang="en-US" dirty="0" smtClean="0"/>
+              <a:t> : Just over 1 sec</a:t>
+            </a:r>
+          </a:p>
+          <a:p>
+            <a:pPr lvl="2"/>
+            <a:r>
+              <a:rPr lang="en-US" dirty="0" err="1" smtClean="0"/>
+              <a:t>PyPy</a:t>
+            </a:r>
+            <a:r>
+              <a:rPr lang="en-US" dirty="0" smtClean="0"/>
+              <a:t> : ~125ms</a:t>
+            </a:r>
+          </a:p>
+          <a:p>
+            <a:pPr lvl="2"/>
+            <a:r>
+              <a:rPr lang="en-US" dirty="0" err="1" smtClean="0"/>
+              <a:t>CPython</a:t>
+            </a:r>
+            <a:r>
+              <a:rPr lang="en-US" dirty="0" smtClean="0"/>
+              <a:t> is almost same speed, and </a:t>
+            </a:r>
+            <a:r>
+              <a:rPr lang="en-US" dirty="0" err="1" smtClean="0"/>
+              <a:t>PyPy</a:t>
+            </a:r>
+            <a:r>
+              <a:rPr lang="en-US" dirty="0" smtClean="0"/>
+              <a:t> is better!</a:t>
             </a:r>
             <a:endParaRPr lang="en-US" dirty="0" smtClean="0"/>
-          </a:p>
-          <a:p>
-            <a:r>
-              <a:rPr lang="en-US" dirty="0" smtClean="0"/>
-              <a:t>Multiprocessing</a:t>
-            </a:r>
-          </a:p>
-          <a:p>
-            <a:pPr lvl="1"/>
-            <a:r>
-              <a:rPr lang="en-US" dirty="0" smtClean="0"/>
-              <a:t>The GIL</a:t>
-            </a:r>
-          </a:p>
-          <a:p>
-            <a:pPr lvl="1"/>
-            <a:r>
-              <a:rPr lang="en-US" dirty="0" err="1" smtClean="0"/>
-              <a:t>Jython</a:t>
-            </a:r>
-            <a:r>
-              <a:rPr lang="en-US" dirty="0" smtClean="0"/>
-              <a:t> – no GIL – true multithreading</a:t>
-            </a:r>
-            <a:endParaRPr lang="en-US" dirty="0"/>
           </a:p>
         </p:txBody>
       </p:sp>
     </p:spTree>
     <p:extLst>
       <p:ext uri="{BB962C8B-B14F-4D97-AF65-F5344CB8AC3E}">
-        <p14:creationId xmlns:p14="http://schemas.microsoft.com/office/powerpoint/2010/main" val="3906047054"/>
+        <p14:creationId xmlns:p14="http://schemas.microsoft.com/office/powerpoint/2010/main" val="4025602318"/>
       </p:ext>
     </p:extLst>
   </p:cSld>
   <p:clrMapOvr>
     <a:masterClrMapping/>
   </p:clrMapOvr>
+  <p:timing>
+    <p:tnLst>
+      <p:par>
+        <p:cTn xmlns:p14="http://schemas.microsoft.com/office/powerpoint/2010/main" id="1" dur="indefinite" restart="never" nodeType="tmRoot"/>
+      </p:par>
+    </p:tnLst>
+  </p:timing>
 </p:sld>
 </file>
 
@@ -4818,6 +4826,118 @@
           <a:lstStyle/>
           <a:p>
             <a:r>
+              <a:rPr lang="en-US" dirty="0" smtClean="0"/>
+              <a:t>Sailing Over the Edge</a:t>
+            </a:r>
+            <a:endParaRPr lang="en-US" dirty="0"/>
+          </a:p>
+        </p:txBody>
+      </p:sp>
+      <p:sp>
+        <p:nvSpPr>
+          <p:cNvPr id="3" name="Content Placeholder 2"/>
+          <p:cNvSpPr>
+            <a:spLocks noGrp="1"/>
+          </p:cNvSpPr>
+          <p:nvPr>
+            <p:ph idx="1"/>
+          </p:nvPr>
+        </p:nvSpPr>
+        <p:spPr/>
+        <p:txBody>
+          <a:bodyPr/>
+          <a:lstStyle/>
+          <a:p>
+            <a:r>
+              <a:rPr lang="en-US" dirty="0" err="1" smtClean="0"/>
+              <a:t>Cython</a:t>
+            </a:r>
+            <a:r>
+              <a:rPr lang="en-US" dirty="0" smtClean="0"/>
+              <a:t> – Python compiled to C, which is then compiled to a </a:t>
+            </a:r>
+            <a:r>
+              <a:rPr lang="en-US" smtClean="0"/>
+              <a:t>CPython</a:t>
+            </a:r>
+            <a:r>
+              <a:rPr lang="en-US" dirty="0" smtClean="0"/>
+              <a:t> module</a:t>
+            </a:r>
+          </a:p>
+          <a:p>
+            <a:r>
+              <a:rPr lang="en-US" dirty="0" smtClean="0"/>
+              <a:t>Multiprocessing</a:t>
+            </a:r>
+          </a:p>
+          <a:p>
+            <a:pPr lvl="1"/>
+            <a:r>
+              <a:rPr lang="en-US" dirty="0" smtClean="0"/>
+              <a:t>The GIL</a:t>
+            </a:r>
+          </a:p>
+          <a:p>
+            <a:pPr lvl="1"/>
+            <a:r>
+              <a:rPr lang="en-US" dirty="0" err="1" smtClean="0"/>
+              <a:t>Jython</a:t>
+            </a:r>
+            <a:r>
+              <a:rPr lang="en-US" dirty="0" smtClean="0"/>
+              <a:t> – no GIL – true multithreading</a:t>
+            </a:r>
+            <a:endParaRPr lang="en-US" dirty="0"/>
+          </a:p>
+        </p:txBody>
+      </p:sp>
+    </p:spTree>
+    <p:extLst>
+      <p:ext uri="{BB962C8B-B14F-4D97-AF65-F5344CB8AC3E}">
+        <p14:creationId xmlns:p14="http://schemas.microsoft.com/office/powerpoint/2010/main" val="3906047054"/>
+      </p:ext>
+    </p:extLst>
+  </p:cSld>
+  <p:clrMapOvr>
+    <a:masterClrMapping/>
+  </p:clrMapOvr>
+</p:sld>
+</file>
+
+<file path=ppt/slides/slide16.xml><?xml version="1.0" encoding="utf-8"?>
+<p:sld xmlns:a="http://schemas.openxmlformats.org/drawingml/2006/main" xmlns:r="http://schemas.openxmlformats.org/officeDocument/2006/relationships" xmlns:p="http://schemas.openxmlformats.org/presentationml/2006/main">
+  <p:cSld>
+    <p:spTree>
+      <p:nvGrpSpPr>
+        <p:cNvPr id="1" name=""/>
+        <p:cNvGrpSpPr/>
+        <p:nvPr/>
+      </p:nvGrpSpPr>
+      <p:grpSpPr>
+        <a:xfrm>
+          <a:off x="0" y="0"/>
+          <a:ext cx="0" cy="0"/>
+          <a:chOff x="0" y="0"/>
+          <a:chExt cx="0" cy="0"/>
+        </a:xfrm>
+      </p:grpSpPr>
+      <p:sp>
+        <p:nvSpPr>
+          <p:cNvPr id="2" name="Title 1"/>
+          <p:cNvSpPr>
+            <a:spLocks noGrp="1"/>
+          </p:cNvSpPr>
+          <p:nvPr>
+            <p:ph type="title"/>
+          </p:nvPr>
+        </p:nvSpPr>
+        <p:spPr/>
+        <p:txBody>
+          <a:bodyPr/>
+          <a:lstStyle/>
+          <a:p>
+            <a:r>
               <a:rPr lang="en-US" dirty="0" smtClean="0">
                 <a:latin typeface="Apple Chancery"/>
               </a:rPr>
@@ -4909,7 +5029,7 @@
 </p:sld>
 </file>
 
-<file path=ppt/slides/slide16.xml><?xml version="1.0" encoding="utf-8"?>
+<file path=ppt/slides/slide17.xml><?xml version="1.0" encoding="utf-8"?>
 <p:sld xmlns:a="http://schemas.openxmlformats.org/drawingml/2006/main" xmlns:r="http://schemas.openxmlformats.org/officeDocument/2006/relationships" xmlns:p="http://schemas.openxmlformats.org/presentationml/2006/main">
   <p:cSld>
     <p:spTree>
@@ -6012,11 +6132,7 @@
             <a:pPr lvl="2"/>
             <a:r>
               <a:rPr lang="en-US" dirty="0" smtClean="0"/>
-              <a:t>Module is .</a:t>
-            </a:r>
-            <a:r>
-              <a:rPr lang="en-US" dirty="0" smtClean="0"/>
-              <a:t>5ms with loop of 100x – </a:t>
+              <a:t>Module is .5ms with loop of 100x – </a:t>
             </a:r>
             <a:r>
               <a:rPr lang="en-US" dirty="0" err="1" smtClean="0"/>
@@ -6174,11 +6290,7 @@
             </a:r>
             <a:r>
               <a:rPr lang="en-US" dirty="0" smtClean="0"/>
-              <a:t> : .</a:t>
-            </a:r>
-            <a:r>
-              <a:rPr lang="en-US" dirty="0" smtClean="0"/>
-              <a:t>12ms</a:t>
+              <a:t> : .12ms</a:t>
             </a:r>
           </a:p>
           <a:p>
@@ -6195,7 +6307,6 @@
               <a:rPr lang="en-US" dirty="0" smtClean="0"/>
               <a:t> was 10x slower – module call overhead from Java?</a:t>
             </a:r>
-            <a:endParaRPr lang="en-US" dirty="0" smtClean="0"/>
           </a:p>
           <a:p>
             <a:r>

</xml_diff>